<commit_message>
Remove fail cycle cutting code
</commit_message>
<xml_diff>
--- a/Partitioning Algorithm and Initial Results.pptx
+++ b/Partitioning Algorithm and Initial Results.pptx
@@ -8,10 +8,14 @@
     <p:sldId id="256" r:id="rId2"/>
     <p:sldId id="262" r:id="rId3"/>
     <p:sldId id="258" r:id="rId4"/>
-    <p:sldId id="257" r:id="rId5"/>
-    <p:sldId id="259" r:id="rId6"/>
-    <p:sldId id="260" r:id="rId7"/>
-    <p:sldId id="261" r:id="rId8"/>
+    <p:sldId id="263" r:id="rId5"/>
+    <p:sldId id="264" r:id="rId6"/>
+    <p:sldId id="265" r:id="rId7"/>
+    <p:sldId id="266" r:id="rId8"/>
+    <p:sldId id="257" r:id="rId9"/>
+    <p:sldId id="259" r:id="rId10"/>
+    <p:sldId id="260" r:id="rId11"/>
+    <p:sldId id="261" r:id="rId12"/>
   </p:sldIdLst>
   <p:sldSz cx="9144000" cy="6858000" type="screen4x3"/>
   <p:notesSz cx="6858000" cy="9144000"/>
@@ -294,7 +298,7 @@
           <a:p>
             <a:fld id="{9674196C-5CA3-4053-8720-8066237EE849}" type="datetimeFigureOut">
               <a:rPr lang="en-AU" smtClean="0"/>
-              <a:t>9/03/2013</a:t>
+              <a:t>18/03/2013</a:t>
             </a:fld>
             <a:endParaRPr lang="en-AU"/>
           </a:p>
@@ -464,7 +468,7 @@
           <a:p>
             <a:fld id="{9674196C-5CA3-4053-8720-8066237EE849}" type="datetimeFigureOut">
               <a:rPr lang="en-AU" smtClean="0"/>
-              <a:t>9/03/2013</a:t>
+              <a:t>18/03/2013</a:t>
             </a:fld>
             <a:endParaRPr lang="en-AU"/>
           </a:p>
@@ -644,7 +648,7 @@
           <a:p>
             <a:fld id="{9674196C-5CA3-4053-8720-8066237EE849}" type="datetimeFigureOut">
               <a:rPr lang="en-AU" smtClean="0"/>
-              <a:t>9/03/2013</a:t>
+              <a:t>18/03/2013</a:t>
             </a:fld>
             <a:endParaRPr lang="en-AU"/>
           </a:p>
@@ -814,7 +818,7 @@
           <a:p>
             <a:fld id="{9674196C-5CA3-4053-8720-8066237EE849}" type="datetimeFigureOut">
               <a:rPr lang="en-AU" smtClean="0"/>
-              <a:t>9/03/2013</a:t>
+              <a:t>18/03/2013</a:t>
             </a:fld>
             <a:endParaRPr lang="en-AU"/>
           </a:p>
@@ -1060,7 +1064,7 @@
           <a:p>
             <a:fld id="{9674196C-5CA3-4053-8720-8066237EE849}" type="datetimeFigureOut">
               <a:rPr lang="en-AU" smtClean="0"/>
-              <a:t>9/03/2013</a:t>
+              <a:t>18/03/2013</a:t>
             </a:fld>
             <a:endParaRPr lang="en-AU"/>
           </a:p>
@@ -1348,7 +1352,7 @@
           <a:p>
             <a:fld id="{9674196C-5CA3-4053-8720-8066237EE849}" type="datetimeFigureOut">
               <a:rPr lang="en-AU" smtClean="0"/>
-              <a:t>9/03/2013</a:t>
+              <a:t>18/03/2013</a:t>
             </a:fld>
             <a:endParaRPr lang="en-AU"/>
           </a:p>
@@ -1770,7 +1774,7 @@
           <a:p>
             <a:fld id="{9674196C-5CA3-4053-8720-8066237EE849}" type="datetimeFigureOut">
               <a:rPr lang="en-AU" smtClean="0"/>
-              <a:t>9/03/2013</a:t>
+              <a:t>18/03/2013</a:t>
             </a:fld>
             <a:endParaRPr lang="en-AU"/>
           </a:p>
@@ -1888,7 +1892,7 @@
           <a:p>
             <a:fld id="{9674196C-5CA3-4053-8720-8066237EE849}" type="datetimeFigureOut">
               <a:rPr lang="en-AU" smtClean="0"/>
-              <a:t>9/03/2013</a:t>
+              <a:t>18/03/2013</a:t>
             </a:fld>
             <a:endParaRPr lang="en-AU"/>
           </a:p>
@@ -1983,7 +1987,7 @@
           <a:p>
             <a:fld id="{9674196C-5CA3-4053-8720-8066237EE849}" type="datetimeFigureOut">
               <a:rPr lang="en-AU" smtClean="0"/>
-              <a:t>9/03/2013</a:t>
+              <a:t>18/03/2013</a:t>
             </a:fld>
             <a:endParaRPr lang="en-AU"/>
           </a:p>
@@ -2260,7 +2264,7 @@
           <a:p>
             <a:fld id="{9674196C-5CA3-4053-8720-8066237EE849}" type="datetimeFigureOut">
               <a:rPr lang="en-AU" smtClean="0"/>
-              <a:t>9/03/2013</a:t>
+              <a:t>18/03/2013</a:t>
             </a:fld>
             <a:endParaRPr lang="en-AU"/>
           </a:p>
@@ -2513,7 +2517,7 @@
           <a:p>
             <a:fld id="{9674196C-5CA3-4053-8720-8066237EE849}" type="datetimeFigureOut">
               <a:rPr lang="en-AU" smtClean="0"/>
-              <a:t>9/03/2013</a:t>
+              <a:t>18/03/2013</a:t>
             </a:fld>
             <a:endParaRPr lang="en-AU"/>
           </a:p>
@@ -2726,7 +2730,7 @@
           <a:p>
             <a:fld id="{9674196C-5CA3-4053-8720-8066237EE849}" type="datetimeFigureOut">
               <a:rPr lang="en-AU" smtClean="0"/>
-              <a:t>9/03/2013</a:t>
+              <a:t>18/03/2013</a:t>
             </a:fld>
             <a:endParaRPr lang="en-AU"/>
           </a:p>
@@ -3156,6 +3160,633 @@
 </p:sld>
 </file>
 
+<file path=ppt/slides/slide10.xml><?xml version="1.0" encoding="utf-8"?>
+<p:sld xmlns:a="http://schemas.openxmlformats.org/drawingml/2006/main" xmlns:r="http://schemas.openxmlformats.org/officeDocument/2006/relationships" xmlns:p="http://schemas.openxmlformats.org/presentationml/2006/main">
+  <p:cSld>
+    <p:spTree>
+      <p:nvGrpSpPr>
+        <p:cNvPr id="1" name=""/>
+        <p:cNvGrpSpPr/>
+        <p:nvPr/>
+      </p:nvGrpSpPr>
+      <p:grpSpPr>
+        <a:xfrm>
+          <a:off x="0" y="0"/>
+          <a:ext cx="0" cy="0"/>
+          <a:chOff x="0" y="0"/>
+          <a:chExt cx="0" cy="0"/>
+        </a:xfrm>
+      </p:grpSpPr>
+      <p:sp>
+        <p:nvSpPr>
+          <p:cNvPr id="2" name="Title 1"/>
+          <p:cNvSpPr>
+            <a:spLocks noGrp="1"/>
+          </p:cNvSpPr>
+          <p:nvPr>
+            <p:ph type="title"/>
+          </p:nvPr>
+        </p:nvSpPr>
+        <p:spPr/>
+        <p:txBody>
+          <a:bodyPr/>
+          <a:lstStyle/>
+          <a:p>
+            <a:r>
+              <a:rPr lang="en-AU" dirty="0" smtClean="0"/>
+              <a:t>Algorithm 3</a:t>
+            </a:r>
+            <a:endParaRPr lang="en-AU" dirty="0"/>
+          </a:p>
+        </p:txBody>
+      </p:sp>
+      <p:sp>
+        <p:nvSpPr>
+          <p:cNvPr id="3" name="Content Placeholder 2"/>
+          <p:cNvSpPr>
+            <a:spLocks noGrp="1"/>
+          </p:cNvSpPr>
+          <p:nvPr>
+            <p:ph idx="1"/>
+          </p:nvPr>
+        </p:nvSpPr>
+        <p:spPr>
+          <a:xfrm>
+            <a:off x="395536" y="1196752"/>
+            <a:ext cx="8229600" cy="5400600"/>
+          </a:xfrm>
+        </p:spPr>
+        <p:txBody>
+          <a:bodyPr numCol="2">
+            <a:normAutofit fontScale="47500" lnSpcReduction="20000"/>
+          </a:bodyPr>
+          <a:lstStyle/>
+          <a:p>
+            <a:r>
+              <a:rPr lang="en-AU" dirty="0" smtClean="0"/>
+              <a:t>model = network-&gt;</a:t>
+            </a:r>
+            <a:r>
+              <a:rPr lang="en-AU" dirty="0" err="1" smtClean="0"/>
+              <a:t>MainModel</a:t>
+            </a:r>
+            <a:endParaRPr lang="en-AU" dirty="0" smtClean="0"/>
+          </a:p>
+          <a:p>
+            <a:r>
+              <a:rPr lang="en-AU" dirty="0" smtClean="0"/>
+              <a:t>FOREACH output in model</a:t>
+            </a:r>
+          </a:p>
+          <a:p>
+            <a:r>
+              <a:rPr lang="en-AU" dirty="0" smtClean="0"/>
+              <a:t>   </a:t>
+            </a:r>
+            <a:r>
+              <a:rPr lang="en-AU" dirty="0" err="1" smtClean="0"/>
+              <a:t>q.Add</a:t>
+            </a:r>
+            <a:r>
+              <a:rPr lang="en-AU" dirty="0" smtClean="0"/>
+              <a:t>(output-&gt;source)</a:t>
+            </a:r>
+          </a:p>
+          <a:p>
+            <a:r>
+              <a:rPr lang="en-AU" dirty="0" smtClean="0"/>
+              <a:t>partition = </a:t>
+            </a:r>
+            <a:r>
+              <a:rPr lang="en-AU" dirty="0" smtClean="0"/>
+              <a:t>new </a:t>
+            </a:r>
+            <a:r>
+              <a:rPr lang="en-AU" dirty="0" err="1" smtClean="0"/>
+              <a:t>EmptyModel</a:t>
+            </a:r>
+            <a:endParaRPr lang="en-AU" dirty="0" smtClean="0"/>
+          </a:p>
+          <a:p>
+            <a:r>
+              <a:rPr lang="en-AU" dirty="0" smtClean="0"/>
+              <a:t>WHILE node = </a:t>
+            </a:r>
+            <a:r>
+              <a:rPr lang="en-AU" dirty="0" err="1" smtClean="0"/>
+              <a:t>q.pop</a:t>
+            </a:r>
+            <a:endParaRPr lang="en-AU" dirty="0" smtClean="0"/>
+          </a:p>
+          <a:p>
+            <a:r>
+              <a:rPr lang="en-AU" dirty="0" smtClean="0"/>
+              <a:t>   IF visited(node)</a:t>
+            </a:r>
+          </a:p>
+          <a:p>
+            <a:r>
+              <a:rPr lang="en-AU" dirty="0" smtClean="0"/>
+              <a:t>      CONTINUE</a:t>
+            </a:r>
+          </a:p>
+          <a:p>
+            <a:r>
+              <a:rPr lang="en-AU" dirty="0" smtClean="0"/>
+              <a:t>   IF </a:t>
+            </a:r>
+            <a:r>
+              <a:rPr lang="en-AU" dirty="0" err="1" smtClean="0"/>
+              <a:t>partition+node</a:t>
+            </a:r>
+            <a:r>
+              <a:rPr lang="en-AU" dirty="0" smtClean="0"/>
+              <a:t> &gt; limits</a:t>
+            </a:r>
+          </a:p>
+          <a:p>
+            <a:r>
+              <a:rPr lang="en-AU" dirty="0" smtClean="0"/>
+              <a:t>      </a:t>
+            </a:r>
+            <a:r>
+              <a:rPr lang="en-AU" dirty="0" err="1" smtClean="0"/>
+              <a:t>WriteModelToNewFile</a:t>
+            </a:r>
+            <a:r>
+              <a:rPr lang="en-AU" dirty="0" smtClean="0"/>
+              <a:t>(partition)</a:t>
+            </a:r>
+          </a:p>
+          <a:p>
+            <a:r>
+              <a:rPr lang="en-AU" dirty="0" smtClean="0"/>
+              <a:t>      partition = </a:t>
+            </a:r>
+            <a:r>
+              <a:rPr lang="en-AU" dirty="0" smtClean="0"/>
+              <a:t>new </a:t>
+            </a:r>
+            <a:r>
+              <a:rPr lang="en-AU" dirty="0" err="1" smtClean="0"/>
+              <a:t>EmptyModel</a:t>
+            </a:r>
+            <a:endParaRPr lang="en-AU" dirty="0" smtClean="0"/>
+          </a:p>
+          <a:p>
+            <a:r>
+              <a:rPr lang="en-AU" dirty="0" smtClean="0"/>
+              <a:t>   </a:t>
+            </a:r>
+            <a:r>
+              <a:rPr lang="en-AU" dirty="0" err="1" smtClean="0"/>
+              <a:t>partition.Add</a:t>
+            </a:r>
+            <a:r>
+              <a:rPr lang="en-AU" dirty="0" smtClean="0"/>
+              <a:t>(node)</a:t>
+            </a:r>
+          </a:p>
+          <a:p>
+            <a:r>
+              <a:rPr lang="en-AU" dirty="0" smtClean="0"/>
+              <a:t>   FOREACH input in node-&gt;inputs</a:t>
+            </a:r>
+          </a:p>
+          <a:p>
+            <a:r>
+              <a:rPr lang="en-AU" dirty="0" smtClean="0"/>
+              <a:t>      </a:t>
+            </a:r>
+            <a:r>
+              <a:rPr lang="en-AU" dirty="0" err="1" smtClean="0"/>
+              <a:t>q.Add</a:t>
+            </a:r>
+            <a:r>
+              <a:rPr lang="en-AU" dirty="0" smtClean="0"/>
+              <a:t>(input-&gt;source)</a:t>
+            </a:r>
+          </a:p>
+          <a:p>
+            <a:r>
+              <a:rPr lang="en-AU" dirty="0" smtClean="0"/>
+              <a:t> </a:t>
+            </a:r>
+            <a:r>
+              <a:rPr lang="en-AU" dirty="0" err="1" smtClean="0"/>
+              <a:t>WriteModelToNewFile</a:t>
+            </a:r>
+            <a:r>
+              <a:rPr lang="en-AU" dirty="0" smtClean="0"/>
+              <a:t>(partition)</a:t>
+            </a:r>
+          </a:p>
+          <a:p>
+            <a:endParaRPr lang="en-AU" dirty="0" smtClean="0"/>
+          </a:p>
+          <a:p>
+            <a:r>
+              <a:rPr lang="en-AU" dirty="0" smtClean="0"/>
+              <a:t>Model::Add(node)</a:t>
+            </a:r>
+          </a:p>
+          <a:p>
+            <a:r>
+              <a:rPr lang="en-AU" dirty="0" smtClean="0"/>
+              <a:t>   </a:t>
+            </a:r>
+            <a:r>
+              <a:rPr lang="en-AU" dirty="0" err="1" smtClean="0"/>
+              <a:t>nodeCollection.Add</a:t>
+            </a:r>
+            <a:r>
+              <a:rPr lang="en-AU" dirty="0" smtClean="0"/>
+              <a:t>(node)</a:t>
+            </a:r>
+          </a:p>
+          <a:p>
+            <a:r>
+              <a:rPr lang="en-AU" dirty="0" smtClean="0"/>
+              <a:t>   </a:t>
+            </a:r>
+            <a:r>
+              <a:rPr lang="en-AU" dirty="0" err="1" smtClean="0"/>
+              <a:t>UpdateSignals</a:t>
+            </a:r>
+            <a:r>
+              <a:rPr lang="en-AU" dirty="0" smtClean="0"/>
+              <a:t>(node)</a:t>
+            </a:r>
+          </a:p>
+          <a:p>
+            <a:r>
+              <a:rPr lang="en-AU" dirty="0" smtClean="0"/>
+              <a:t>   </a:t>
+            </a:r>
+            <a:r>
+              <a:rPr lang="en-AU" dirty="0" err="1" smtClean="0"/>
+              <a:t>inCost</a:t>
+            </a:r>
+            <a:r>
+              <a:rPr lang="en-AU" dirty="0" smtClean="0"/>
+              <a:t> = </a:t>
+            </a:r>
+            <a:r>
+              <a:rPr lang="en-AU" dirty="0" err="1" smtClean="0"/>
+              <a:t>MaxInputCost</a:t>
+            </a:r>
+            <a:endParaRPr lang="en-AU" dirty="0" smtClean="0"/>
+          </a:p>
+          <a:p>
+            <a:r>
+              <a:rPr lang="en-AU" dirty="0" smtClean="0"/>
+              <a:t>   </a:t>
+            </a:r>
+            <a:r>
+              <a:rPr lang="en-AU" dirty="0" err="1" smtClean="0"/>
+              <a:t>UpdateCosts</a:t>
+            </a:r>
+            <a:r>
+              <a:rPr lang="en-AU" dirty="0" smtClean="0"/>
+              <a:t>(node, </a:t>
+            </a:r>
+            <a:r>
+              <a:rPr lang="en-AU" dirty="0" err="1" smtClean="0"/>
+              <a:t>inCost</a:t>
+            </a:r>
+            <a:r>
+              <a:rPr lang="en-AU" dirty="0" smtClean="0"/>
+              <a:t>)</a:t>
+            </a:r>
+          </a:p>
+          <a:p>
+            <a:endParaRPr lang="en-AU" dirty="0" smtClean="0"/>
+          </a:p>
+          <a:p>
+            <a:r>
+              <a:rPr lang="en-AU" dirty="0" smtClean="0"/>
+              <a:t>Model::</a:t>
+            </a:r>
+            <a:r>
+              <a:rPr lang="en-AU" dirty="0" err="1" smtClean="0"/>
+              <a:t>UpdateCosts</a:t>
+            </a:r>
+            <a:r>
+              <a:rPr lang="en-AU" dirty="0" smtClean="0"/>
+              <a:t>(node, </a:t>
+            </a:r>
+            <a:r>
+              <a:rPr lang="en-AU" dirty="0" err="1" smtClean="0"/>
+              <a:t>inCost</a:t>
+            </a:r>
+            <a:r>
+              <a:rPr lang="en-AU" dirty="0" smtClean="0"/>
+              <a:t>)</a:t>
+            </a:r>
+          </a:p>
+          <a:p>
+            <a:r>
+              <a:rPr lang="en-AU" dirty="0" smtClean="0"/>
+              <a:t>   </a:t>
+            </a:r>
+            <a:r>
+              <a:rPr lang="en-AU" dirty="0" err="1" smtClean="0"/>
+              <a:t>nodeCost</a:t>
+            </a:r>
+            <a:r>
+              <a:rPr lang="en-AU" dirty="0" smtClean="0"/>
+              <a:t> = </a:t>
+            </a:r>
+            <a:r>
+              <a:rPr lang="en-AU" dirty="0" err="1" smtClean="0"/>
+              <a:t>inCost+InnateCost</a:t>
+            </a:r>
+            <a:endParaRPr lang="en-AU" dirty="0" smtClean="0"/>
+          </a:p>
+          <a:p>
+            <a:r>
+              <a:rPr lang="en-AU" dirty="0" smtClean="0"/>
+              <a:t>   </a:t>
+            </a:r>
+            <a:r>
+              <a:rPr lang="en-AU" dirty="0" err="1" smtClean="0"/>
+              <a:t>MarkVisited</a:t>
+            </a:r>
+            <a:r>
+              <a:rPr lang="en-AU" dirty="0" smtClean="0"/>
+              <a:t>(node)</a:t>
+            </a:r>
+          </a:p>
+          <a:p>
+            <a:r>
+              <a:rPr lang="en-AU" dirty="0" smtClean="0"/>
+              <a:t>   FOREACH sink in node-&gt;sinks</a:t>
+            </a:r>
+          </a:p>
+          <a:p>
+            <a:r>
+              <a:rPr lang="en-AU" dirty="0" smtClean="0"/>
+              <a:t>      IF visited(sink)</a:t>
+            </a:r>
+          </a:p>
+          <a:p>
+            <a:r>
+              <a:rPr lang="en-AU" dirty="0" smtClean="0"/>
+              <a:t>         Cut(node, sink)</a:t>
+            </a:r>
+          </a:p>
+          <a:p>
+            <a:r>
+              <a:rPr lang="en-AU" dirty="0" smtClean="0"/>
+              <a:t>      ELSE</a:t>
+            </a:r>
+          </a:p>
+          <a:p>
+            <a:r>
+              <a:rPr lang="en-AU" dirty="0" smtClean="0"/>
+              <a:t>         </a:t>
+            </a:r>
+            <a:r>
+              <a:rPr lang="en-AU" dirty="0" err="1" smtClean="0"/>
+              <a:t>UpdateCosts</a:t>
+            </a:r>
+            <a:r>
+              <a:rPr lang="en-AU" dirty="0" smtClean="0"/>
+              <a:t>(sink, </a:t>
+            </a:r>
+            <a:r>
+              <a:rPr lang="en-AU" dirty="0" err="1" smtClean="0"/>
+              <a:t>nodeCost</a:t>
+            </a:r>
+            <a:r>
+              <a:rPr lang="en-AU" dirty="0" smtClean="0"/>
+              <a:t>)</a:t>
+            </a:r>
+          </a:p>
+          <a:p>
+            <a:r>
+              <a:rPr lang="en-AU" dirty="0" smtClean="0"/>
+              <a:t>         </a:t>
+            </a:r>
+          </a:p>
+          <a:p>
+            <a:r>
+              <a:rPr lang="en-AU" dirty="0" smtClean="0"/>
+              <a:t>//Rename the signals, then after TMR we can </a:t>
+            </a:r>
+            <a:r>
+              <a:rPr lang="en-AU" dirty="0" err="1" smtClean="0"/>
+              <a:t>rejoin</a:t>
+            </a:r>
+            <a:r>
+              <a:rPr lang="en-AU" dirty="0" smtClean="0"/>
+              <a:t> them outside the partition</a:t>
+            </a:r>
+          </a:p>
+          <a:p>
+            <a:r>
+              <a:rPr lang="en-AU" dirty="0" smtClean="0"/>
+              <a:t>Model::Cut(source, sink)</a:t>
+            </a:r>
+          </a:p>
+          <a:p>
+            <a:r>
+              <a:rPr lang="en-AU" dirty="0" smtClean="0"/>
+              <a:t>   source-&gt;output = "</a:t>
+            </a:r>
+            <a:r>
+              <a:rPr lang="en-AU" dirty="0" err="1" smtClean="0"/>
+              <a:t>SpecialOut</a:t>
+            </a:r>
+            <a:r>
+              <a:rPr lang="en-AU" dirty="0" smtClean="0"/>
+              <a:t>"+source-&gt;output</a:t>
+            </a:r>
+          </a:p>
+          <a:p>
+            <a:r>
+              <a:rPr lang="en-AU" dirty="0" smtClean="0"/>
+              <a:t>   sink-&gt;inputs[source-&gt;output] = "</a:t>
+            </a:r>
+            <a:r>
+              <a:rPr lang="en-AU" dirty="0" err="1" smtClean="0"/>
+              <a:t>SpecialIn"source</a:t>
+            </a:r>
+            <a:r>
+              <a:rPr lang="en-AU" dirty="0" smtClean="0"/>
+              <a:t>-&gt;output</a:t>
+            </a:r>
+          </a:p>
+          <a:p>
+            <a:r>
+              <a:rPr lang="en-AU" dirty="0" smtClean="0"/>
+              <a:t>   </a:t>
+            </a:r>
+            <a:r>
+              <a:rPr lang="en-AU" dirty="0" err="1" smtClean="0"/>
+              <a:t>Model.AddInput</a:t>
+            </a:r>
+            <a:r>
+              <a:rPr lang="en-AU" dirty="0" smtClean="0"/>
+              <a:t>("</a:t>
+            </a:r>
+            <a:r>
+              <a:rPr lang="en-AU" dirty="0" err="1" smtClean="0"/>
+              <a:t>SpecialIn"source</a:t>
+            </a:r>
+            <a:r>
+              <a:rPr lang="en-AU" dirty="0" smtClean="0"/>
+              <a:t>-&gt;output)</a:t>
+            </a:r>
+          </a:p>
+          <a:p>
+            <a:r>
+              <a:rPr lang="en-AU" dirty="0" smtClean="0"/>
+              <a:t>   </a:t>
+            </a:r>
+            <a:r>
+              <a:rPr lang="en-AU" dirty="0" err="1" smtClean="0"/>
+              <a:t>Model.AddOutput</a:t>
+            </a:r>
+            <a:r>
+              <a:rPr lang="en-AU" dirty="0" smtClean="0"/>
+              <a:t>("</a:t>
+            </a:r>
+            <a:r>
+              <a:rPr lang="en-AU" dirty="0" err="1" smtClean="0"/>
+              <a:t>SpecialOut</a:t>
+            </a:r>
+            <a:r>
+              <a:rPr lang="en-AU" dirty="0" smtClean="0"/>
+              <a:t>"+source-&gt;output)</a:t>
+            </a:r>
+            <a:endParaRPr lang="en-AU" dirty="0"/>
+          </a:p>
+        </p:txBody>
+      </p:sp>
+    </p:spTree>
+    <p:extLst>
+      <p:ext uri="{BB962C8B-B14F-4D97-AF65-F5344CB8AC3E}">
+        <p14:creationId xmlns:p14="http://schemas.microsoft.com/office/powerpoint/2010/main" val="1554047530"/>
+      </p:ext>
+    </p:extLst>
+  </p:cSld>
+  <p:clrMapOvr>
+    <a:masterClrMapping/>
+  </p:clrMapOvr>
+</p:sld>
+</file>
+
+<file path=ppt/slides/slide11.xml><?xml version="1.0" encoding="utf-8"?>
+<p:sld xmlns:a="http://schemas.openxmlformats.org/drawingml/2006/main" xmlns:r="http://schemas.openxmlformats.org/officeDocument/2006/relationships" xmlns:p="http://schemas.openxmlformats.org/presentationml/2006/main">
+  <p:cSld>
+    <p:spTree>
+      <p:nvGrpSpPr>
+        <p:cNvPr id="1" name=""/>
+        <p:cNvGrpSpPr/>
+        <p:nvPr/>
+      </p:nvGrpSpPr>
+      <p:grpSpPr>
+        <a:xfrm>
+          <a:off x="0" y="0"/>
+          <a:ext cx="0" cy="0"/>
+          <a:chOff x="0" y="0"/>
+          <a:chExt cx="0" cy="0"/>
+        </a:xfrm>
+      </p:grpSpPr>
+      <p:sp>
+        <p:nvSpPr>
+          <p:cNvPr id="2" name="Title 1"/>
+          <p:cNvSpPr>
+            <a:spLocks noGrp="1"/>
+          </p:cNvSpPr>
+          <p:nvPr>
+            <p:ph type="title"/>
+          </p:nvPr>
+        </p:nvSpPr>
+        <p:spPr/>
+        <p:txBody>
+          <a:bodyPr/>
+          <a:lstStyle/>
+          <a:p>
+            <a:r>
+              <a:rPr lang="en-AU" dirty="0" smtClean="0"/>
+              <a:t>Results</a:t>
+            </a:r>
+            <a:endParaRPr lang="en-AU" dirty="0"/>
+          </a:p>
+        </p:txBody>
+      </p:sp>
+      <p:sp>
+        <p:nvSpPr>
+          <p:cNvPr id="3" name="Content Placeholder 2"/>
+          <p:cNvSpPr>
+            <a:spLocks noGrp="1"/>
+          </p:cNvSpPr>
+          <p:nvPr>
+            <p:ph idx="1"/>
+          </p:nvPr>
+        </p:nvSpPr>
+        <p:spPr/>
+        <p:txBody>
+          <a:bodyPr>
+            <a:normAutofit/>
+          </a:bodyPr>
+          <a:lstStyle/>
+          <a:p>
+            <a:r>
+              <a:rPr lang="en-AU" dirty="0" smtClean="0"/>
+              <a:t>Use very small partitions, to magnify effect.</a:t>
+            </a:r>
+          </a:p>
+          <a:p>
+            <a:r>
+              <a:rPr lang="en-AU" dirty="0" smtClean="0"/>
+              <a:t>Routing is still the dominant contributor to time spent in workflow.</a:t>
+            </a:r>
+          </a:p>
+          <a:p>
+            <a:r>
+              <a:rPr lang="en-AU" dirty="0" smtClean="0"/>
+              <a:t>Latency from 10%-80% increase.</a:t>
+            </a:r>
+          </a:p>
+          <a:p>
+            <a:r>
+              <a:rPr lang="en-AU" dirty="0" smtClean="0"/>
+              <a:t>Area, number of elements, </a:t>
+            </a:r>
+            <a:r>
+              <a:rPr lang="en-AU" dirty="0" err="1" smtClean="0"/>
+              <a:t>etc</a:t>
+            </a:r>
+            <a:r>
+              <a:rPr lang="en-AU" dirty="0" smtClean="0"/>
+              <a:t>, all more or less triple.</a:t>
+            </a:r>
+          </a:p>
+          <a:p>
+            <a:r>
+              <a:rPr lang="en-AU" dirty="0" smtClean="0"/>
+              <a:t>Number of nets on the critical path usually increases, sometimes decreases.</a:t>
+            </a:r>
+            <a:endParaRPr lang="en-AU" dirty="0"/>
+          </a:p>
+        </p:txBody>
+      </p:sp>
+    </p:spTree>
+    <p:extLst>
+      <p:ext uri="{BB962C8B-B14F-4D97-AF65-F5344CB8AC3E}">
+        <p14:creationId xmlns:p14="http://schemas.microsoft.com/office/powerpoint/2010/main" val="1647370932"/>
+      </p:ext>
+    </p:extLst>
+  </p:cSld>
+  <p:clrMapOvr>
+    <a:masterClrMapping/>
+  </p:clrMapOvr>
+</p:sld>
+</file>
+
 <file path=ppt/slides/slide2.xml><?xml version="1.0" encoding="utf-8"?>
 <p:sld xmlns:a="http://schemas.openxmlformats.org/drawingml/2006/main" xmlns:r="http://schemas.openxmlformats.org/officeDocument/2006/relationships" xmlns:p="http://schemas.openxmlformats.org/presentationml/2006/main">
   <p:cSld>
@@ -3579,61 +4210,91 @@
         <p:spPr/>
         <p:txBody>
           <a:bodyPr>
-            <a:normAutofit fontScale="85000" lnSpcReduction="10000"/>
+            <a:normAutofit fontScale="92500"/>
           </a:bodyPr>
           <a:lstStyle/>
           <a:p>
-            <a:r>
-              <a:rPr lang="en-AU" dirty="0" smtClean="0"/>
-              <a:t>1. Read entire file into memory, and represent it as a graph.</a:t>
-            </a:r>
-          </a:p>
-          <a:p>
-            <a:r>
-              <a:rPr lang="en-AU" dirty="0" smtClean="0"/>
-              <a:t>Each Model has a list of nodes and map of           </a:t>
-            </a:r>
-            <a:r>
-              <a:rPr lang="en-AU" dirty="0" err="1" smtClean="0"/>
-              <a:t>signalName</a:t>
-            </a:r>
-            <a:r>
-              <a:rPr lang="en-AU" dirty="0" smtClean="0"/>
-              <a:t>-&gt;Signal</a:t>
-            </a:r>
-          </a:p>
-          <a:p>
-            <a:r>
-              <a:rPr lang="en-AU" dirty="0" smtClean="0"/>
-              <a:t>Each signal points to its source and sinks</a:t>
-            </a:r>
-          </a:p>
-          <a:p>
-            <a:r>
-              <a:rPr lang="en-AU" dirty="0" smtClean="0"/>
-              <a:t>Each node has a list (string) of inputs and outputs (+type, </a:t>
-            </a:r>
-            <a:r>
-              <a:rPr lang="en-AU" dirty="0" err="1" smtClean="0"/>
-              <a:t>etc</a:t>
-            </a:r>
-            <a:r>
-              <a:rPr lang="en-AU" dirty="0" smtClean="0"/>
-              <a:t>).</a:t>
-            </a:r>
-          </a:p>
-          <a:p>
-            <a:r>
-              <a:rPr lang="en-AU" dirty="0" smtClean="0"/>
-              <a:t>Why do nodes have strings, which are looked up in a map to the signal, which points to the node? Why not have each node just point to the other node? Because of the way models are made and manipulated.</a:t>
-            </a:r>
+            <a:pPr marL="514350" indent="-514350">
+              <a:buFont typeface="+mj-lt"/>
+              <a:buAutoNum type="arabicPeriod"/>
+            </a:pPr>
+            <a:r>
+              <a:rPr lang="en-AU" dirty="0" smtClean="0"/>
+              <a:t>Read network into memory</a:t>
+            </a:r>
+          </a:p>
+          <a:p>
+            <a:pPr marL="514350" indent="-514350">
+              <a:buFont typeface="+mj-lt"/>
+              <a:buAutoNum type="arabicPeriod"/>
+            </a:pPr>
+            <a:r>
+              <a:rPr lang="en-AU" dirty="0" smtClean="0"/>
+              <a:t>Traverse breadth first from outputs</a:t>
+            </a:r>
+          </a:p>
+          <a:p>
+            <a:pPr marL="514350" indent="-514350">
+              <a:buFont typeface="+mj-lt"/>
+              <a:buAutoNum type="arabicPeriod"/>
+            </a:pPr>
+            <a:r>
+              <a:rPr lang="en-AU" dirty="0" smtClean="0"/>
+              <a:t>Add node to new partition until partition full</a:t>
+            </a:r>
+          </a:p>
+          <a:p>
+            <a:pPr marL="514350" indent="-514350">
+              <a:buFont typeface="+mj-lt"/>
+              <a:buAutoNum type="arabicPeriod"/>
+            </a:pPr>
+            <a:r>
+              <a:rPr lang="en-AU" dirty="0" smtClean="0"/>
+              <a:t>Write partition to file</a:t>
+            </a:r>
+          </a:p>
+          <a:p>
+            <a:pPr marL="514350" indent="-514350">
+              <a:buFont typeface="+mj-lt"/>
+              <a:buAutoNum type="arabicPeriod"/>
+            </a:pPr>
+            <a:r>
+              <a:rPr lang="en-AU" dirty="0" smtClean="0"/>
+              <a:t>Continue </a:t>
+            </a:r>
+            <a:r>
+              <a:rPr lang="en-AU" dirty="0" smtClean="0"/>
+              <a:t>until each node has been visited once</a:t>
+            </a:r>
+            <a:endParaRPr lang="en-AU" dirty="0" smtClean="0"/>
+          </a:p>
+          <a:p>
+            <a:pPr marL="514350" indent="-514350">
+              <a:buFont typeface="+mj-lt"/>
+              <a:buAutoNum type="arabicPeriod"/>
+            </a:pPr>
+            <a:r>
+              <a:rPr lang="en-AU" dirty="0" smtClean="0"/>
+              <a:t>Treat each partition as black box and triplicate it</a:t>
+            </a:r>
+          </a:p>
+          <a:p>
+            <a:pPr marL="514350" indent="-514350">
+              <a:buFont typeface="+mj-lt"/>
+              <a:buAutoNum type="arabicPeriod"/>
+            </a:pPr>
+            <a:r>
+              <a:rPr lang="en-AU" dirty="0" smtClean="0"/>
+              <a:t>Treat each TMR partition as black box and join them</a:t>
+            </a:r>
+            <a:endParaRPr lang="en-AU" dirty="0"/>
           </a:p>
         </p:txBody>
       </p:sp>
     </p:spTree>
     <p:extLst>
       <p:ext uri="{BB962C8B-B14F-4D97-AF65-F5344CB8AC3E}">
-        <p14:creationId xmlns:p14="http://schemas.microsoft.com/office/powerpoint/2010/main" val="109906193"/>
+        <p14:creationId xmlns:p14="http://schemas.microsoft.com/office/powerpoint/2010/main" val="3777985684"/>
       </p:ext>
     </p:extLst>
   </p:cSld>
@@ -3677,7 +4338,7 @@
           <a:p>
             <a:r>
               <a:rPr lang="en-AU" dirty="0" smtClean="0"/>
-              <a:t>Algorithm 2</a:t>
+              <a:t>Algorithm – Adding Node</a:t>
             </a:r>
             <a:endParaRPr lang="en-AU" dirty="0"/>
           </a:p>
@@ -3695,50 +4356,36 @@
         </p:nvSpPr>
         <p:spPr/>
         <p:txBody>
-          <a:bodyPr>
-            <a:normAutofit fontScale="85000" lnSpcReduction="10000"/>
-          </a:bodyPr>
-          <a:lstStyle/>
-          <a:p>
-            <a:r>
-              <a:rPr lang="en-AU" dirty="0" smtClean="0"/>
-              <a:t>2. Traverse</a:t>
-            </a:r>
-          </a:p>
-          <a:p>
-            <a:r>
-              <a:rPr lang="en-AU" dirty="0" smtClean="0"/>
-              <a:t>Start at one end, adding connected nodes to partition. Once partition reaches limit, write it out, remove those nodes from the network, and repeat.</a:t>
-            </a:r>
-          </a:p>
-          <a:p>
-            <a:r>
-              <a:rPr lang="en-AU" dirty="0" smtClean="0"/>
-              <a:t>Specifically, start at outputs not inputs due to e.g. [IMAGE]</a:t>
-            </a:r>
-          </a:p>
-          <a:p>
-            <a:r>
-              <a:rPr lang="en-AU" dirty="0" smtClean="0"/>
-              <a:t>3. Adding to Partition</a:t>
-            </a:r>
-          </a:p>
-          <a:p>
-            <a:r>
-              <a:rPr lang="en-AU" dirty="0" smtClean="0"/>
-              <a:t>Add to node collection</a:t>
-            </a:r>
-          </a:p>
-          <a:p>
-            <a:r>
-              <a:rPr lang="en-AU" dirty="0" smtClean="0"/>
-              <a:t>Update Signals</a:t>
-            </a:r>
-          </a:p>
-          <a:p>
-            <a:r>
-              <a:rPr lang="en-AU" dirty="0" smtClean="0"/>
-              <a:t>Recalculate critical path (max cost without cycles)</a:t>
+          <a:bodyPr/>
+          <a:lstStyle/>
+          <a:p>
+            <a:pPr marL="514350" indent="-514350">
+              <a:buFont typeface="+mj-lt"/>
+              <a:buAutoNum type="arabicPeriod"/>
+            </a:pPr>
+            <a:r>
+              <a:rPr lang="en-AU" dirty="0" smtClean="0"/>
+              <a:t>Insert node into network and create signals</a:t>
+            </a:r>
+          </a:p>
+          <a:p>
+            <a:pPr marL="514350" indent="-514350">
+              <a:buFont typeface="+mj-lt"/>
+              <a:buAutoNum type="arabicPeriod"/>
+            </a:pPr>
+            <a:r>
+              <a:rPr lang="en-AU" dirty="0" smtClean="0"/>
+              <a:t>Recursively traverse network keeping track of visited nodes</a:t>
+            </a:r>
+          </a:p>
+          <a:p>
+            <a:pPr marL="514350" indent="-514350">
+              <a:buFont typeface="+mj-lt"/>
+              <a:buAutoNum type="arabicPeriod"/>
+            </a:pPr>
+            <a:r>
+              <a:rPr lang="en-AU" dirty="0" smtClean="0"/>
+              <a:t>If an already visited node is reached, cut link between node and parent</a:t>
             </a:r>
             <a:endParaRPr lang="en-AU" dirty="0"/>
           </a:p>
@@ -3747,7 +4394,7 @@
     </p:spTree>
     <p:extLst>
       <p:ext uri="{BB962C8B-B14F-4D97-AF65-F5344CB8AC3E}">
-        <p14:creationId xmlns:p14="http://schemas.microsoft.com/office/powerpoint/2010/main" val="3157154842"/>
+        <p14:creationId xmlns:p14="http://schemas.microsoft.com/office/powerpoint/2010/main" val="3158655230"/>
       </p:ext>
     </p:extLst>
   </p:cSld>
@@ -3791,7 +4438,7 @@
           <a:p>
             <a:r>
               <a:rPr lang="en-AU" dirty="0" smtClean="0"/>
-              <a:t>Algorithm 3</a:t>
+              <a:t>Example</a:t>
             </a:r>
             <a:endParaRPr lang="en-AU" dirty="0"/>
           </a:p>
@@ -3807,457 +4454,265 @@
             <p:ph idx="1"/>
           </p:nvPr>
         </p:nvSpPr>
-        <p:spPr>
+        <p:spPr/>
+        <p:txBody>
+          <a:bodyPr>
+            <a:normAutofit fontScale="70000" lnSpcReduction="20000"/>
+          </a:bodyPr>
+          <a:lstStyle/>
+          <a:p>
+            <a:pPr marL="0" indent="0">
+              <a:buNone/>
+            </a:pPr>
+            <a:r>
+              <a:rPr lang="en-AU" dirty="0"/>
+              <a:t>.model </a:t>
+            </a:r>
+            <a:r>
+              <a:rPr lang="en-AU" dirty="0" smtClean="0"/>
+              <a:t>main</a:t>
+            </a:r>
+          </a:p>
+          <a:p>
+            <a:pPr marL="0" indent="0">
+              <a:buNone/>
+            </a:pPr>
+            <a:r>
+              <a:rPr lang="en-AU" dirty="0" smtClean="0"/>
+              <a:t>.inputs </a:t>
+            </a:r>
+            <a:r>
+              <a:rPr lang="en-AU" dirty="0"/>
+              <a:t>a b </a:t>
+            </a:r>
+            <a:r>
+              <a:rPr lang="en-AU" dirty="0" smtClean="0"/>
+              <a:t>c</a:t>
+            </a:r>
+          </a:p>
+          <a:p>
+            <a:pPr marL="0" indent="0">
+              <a:buNone/>
+            </a:pPr>
+            <a:r>
+              <a:rPr lang="en-AU" dirty="0" smtClean="0"/>
+              <a:t>.outputs </a:t>
+            </a:r>
+            <a:r>
+              <a:rPr lang="en-AU" dirty="0"/>
+              <a:t>x y </a:t>
+            </a:r>
+            <a:r>
+              <a:rPr lang="en-AU" dirty="0" smtClean="0"/>
+              <a:t>z</a:t>
+            </a:r>
+          </a:p>
+          <a:p>
+            <a:pPr marL="0" indent="0">
+              <a:buNone/>
+            </a:pPr>
+            <a:r>
+              <a:rPr lang="en-AU" dirty="0" smtClean="0"/>
+              <a:t>.</a:t>
+            </a:r>
+            <a:r>
+              <a:rPr lang="en-AU" dirty="0"/>
+              <a:t>clocks </a:t>
+            </a:r>
+            <a:r>
+              <a:rPr lang="en-AU" dirty="0" err="1" smtClean="0"/>
+              <a:t>pclk</a:t>
+            </a:r>
+            <a:endParaRPr lang="en-AU" dirty="0" smtClean="0"/>
+          </a:p>
+          <a:p>
+            <a:pPr marL="0" indent="0">
+              <a:buNone/>
+            </a:pPr>
+            <a:r>
+              <a:rPr lang="en-AU" dirty="0" smtClean="0"/>
+              <a:t>.</a:t>
+            </a:r>
+            <a:r>
+              <a:rPr lang="en-AU" dirty="0"/>
+              <a:t>names a b </a:t>
+            </a:r>
+            <a:r>
+              <a:rPr lang="en-AU" dirty="0" smtClean="0"/>
+              <a:t>x</a:t>
+            </a:r>
+          </a:p>
+          <a:p>
+            <a:pPr marL="0" indent="0">
+              <a:buNone/>
+            </a:pPr>
+            <a:r>
+              <a:rPr lang="en-AU" dirty="0" smtClean="0"/>
+              <a:t>11 1</a:t>
+            </a:r>
+          </a:p>
+          <a:p>
+            <a:pPr marL="0" indent="0">
+              <a:buNone/>
+            </a:pPr>
+            <a:r>
+              <a:rPr lang="en-AU" dirty="0" smtClean="0"/>
+              <a:t>.</a:t>
+            </a:r>
+            <a:r>
+              <a:rPr lang="en-AU" dirty="0"/>
+              <a:t>names a b [1</a:t>
+            </a:r>
+            <a:r>
+              <a:rPr lang="en-AU" dirty="0" smtClean="0"/>
+              <a:t>]</a:t>
+            </a:r>
+          </a:p>
+          <a:p>
+            <a:pPr marL="0" indent="0">
+              <a:buNone/>
+            </a:pPr>
+            <a:r>
+              <a:rPr lang="en-AU" dirty="0" smtClean="0"/>
+              <a:t>10 1</a:t>
+            </a:r>
+          </a:p>
+          <a:p>
+            <a:pPr marL="0" indent="0">
+              <a:buNone/>
+            </a:pPr>
+            <a:r>
+              <a:rPr lang="en-AU" dirty="0" smtClean="0"/>
+              <a:t>01 1</a:t>
+            </a:r>
+          </a:p>
+          <a:p>
+            <a:pPr marL="0" indent="0">
+              <a:buNone/>
+            </a:pPr>
+            <a:r>
+              <a:rPr lang="en-AU" dirty="0" smtClean="0"/>
+              <a:t>.</a:t>
+            </a:r>
+            <a:r>
+              <a:rPr lang="en-AU" dirty="0"/>
+              <a:t>latch [1] y re </a:t>
+            </a:r>
+            <a:r>
+              <a:rPr lang="en-AU" dirty="0" err="1"/>
+              <a:t>pclk</a:t>
+            </a:r>
+            <a:r>
+              <a:rPr lang="en-AU" dirty="0"/>
+              <a:t> </a:t>
+            </a:r>
+            <a:r>
+              <a:rPr lang="en-AU" dirty="0" smtClean="0"/>
+              <a:t>2</a:t>
+            </a:r>
+          </a:p>
+          <a:p>
+            <a:pPr marL="0" indent="0">
+              <a:buNone/>
+            </a:pPr>
+            <a:r>
+              <a:rPr lang="en-AU" dirty="0" smtClean="0"/>
+              <a:t>.</a:t>
+            </a:r>
+            <a:r>
+              <a:rPr lang="en-AU" dirty="0"/>
+              <a:t>latch [2] [2] re </a:t>
+            </a:r>
+            <a:r>
+              <a:rPr lang="en-AU" dirty="0" err="1"/>
+              <a:t>pclk</a:t>
+            </a:r>
+            <a:r>
+              <a:rPr lang="en-AU" dirty="0"/>
+              <a:t> </a:t>
+            </a:r>
+            <a:r>
+              <a:rPr lang="en-AU" dirty="0" smtClean="0"/>
+              <a:t>2</a:t>
+            </a:r>
+          </a:p>
+          <a:p>
+            <a:pPr marL="0" indent="0">
+              <a:buNone/>
+            </a:pPr>
+            <a:r>
+              <a:rPr lang="en-AU" dirty="0" smtClean="0"/>
+              <a:t>.</a:t>
+            </a:r>
+            <a:r>
+              <a:rPr lang="en-AU" dirty="0"/>
+              <a:t>names c [2] z11 </a:t>
+            </a:r>
+            <a:r>
+              <a:rPr lang="en-AU" dirty="0" smtClean="0"/>
+              <a:t>1</a:t>
+            </a:r>
+          </a:p>
+          <a:p>
+            <a:pPr marL="0" indent="0">
+              <a:buNone/>
+            </a:pPr>
+            <a:r>
+              <a:rPr lang="en-AU" dirty="0" smtClean="0"/>
+              <a:t>.</a:t>
+            </a:r>
+            <a:r>
+              <a:rPr lang="en-AU" dirty="0"/>
+              <a:t>end</a:t>
+            </a:r>
+          </a:p>
+        </p:txBody>
+      </p:sp>
+      <p:pic>
+        <p:nvPicPr>
+          <p:cNvPr id="2050" name="Picture 2" descr="C:\Users\Dave\Documents\Dropbox\New Folder\out.png"/>
+          <p:cNvPicPr>
+            <a:picLocks noChangeAspect="1" noChangeArrowheads="1"/>
+          </p:cNvPicPr>
+          <p:nvPr/>
+        </p:nvPicPr>
+        <p:blipFill>
+          <a:blip r:embed="rId2">
+            <a:extLst>
+              <a:ext uri="{28A0092B-C50C-407E-A947-70E740481C1C}">
+                <a14:useLocalDpi xmlns:a14="http://schemas.microsoft.com/office/drawing/2010/main" val="0"/>
+              </a:ext>
+            </a:extLst>
+          </a:blip>
+          <a:srcRect/>
+          <a:stretch>
+            <a:fillRect/>
+          </a:stretch>
+        </p:blipFill>
+        <p:spPr bwMode="auto">
           <a:xfrm>
-            <a:off x="395536" y="1196752"/>
-            <a:ext cx="8229600" cy="5400600"/>
+            <a:off x="3923928" y="2060848"/>
+            <a:ext cx="4486275" cy="3305175"/>
           </a:xfrm>
+          <a:prstGeom prst="rect">
+            <a:avLst/>
+          </a:prstGeom>
+          <a:noFill/>
+          <a:extLst>
+            <a:ext uri="{909E8E84-426E-40DD-AFC4-6F175D3DCCD1}">
+              <a14:hiddenFill xmlns:a14="http://schemas.microsoft.com/office/drawing/2010/main">
+                <a:solidFill>
+                  <a:srgbClr val="FFFFFF"/>
+                </a:solidFill>
+              </a14:hiddenFill>
+            </a:ext>
+          </a:extLst>
         </p:spPr>
-        <p:txBody>
-          <a:bodyPr numCol="2">
-            <a:normAutofit fontScale="47500" lnSpcReduction="20000"/>
-          </a:bodyPr>
-          <a:lstStyle/>
-          <a:p>
-            <a:r>
-              <a:rPr lang="en-AU" dirty="0" smtClean="0"/>
-              <a:t>model = network-&gt;</a:t>
-            </a:r>
-            <a:r>
-              <a:rPr lang="en-AU" dirty="0" err="1" smtClean="0"/>
-              <a:t>MainModel</a:t>
-            </a:r>
-            <a:endParaRPr lang="en-AU" dirty="0" smtClean="0"/>
-          </a:p>
-          <a:p>
-            <a:r>
-              <a:rPr lang="en-AU" dirty="0" smtClean="0"/>
-              <a:t>FOREACH output in model</a:t>
-            </a:r>
-          </a:p>
-          <a:p>
-            <a:r>
-              <a:rPr lang="en-AU" dirty="0" smtClean="0"/>
-              <a:t>   </a:t>
-            </a:r>
-            <a:r>
-              <a:rPr lang="en-AU" dirty="0" err="1" smtClean="0"/>
-              <a:t>q.Add</a:t>
-            </a:r>
-            <a:r>
-              <a:rPr lang="en-AU" dirty="0" smtClean="0"/>
-              <a:t>(output-&gt;source)</a:t>
-            </a:r>
-          </a:p>
-          <a:p>
-            <a:r>
-              <a:rPr lang="en-AU" dirty="0" smtClean="0"/>
-              <a:t>partition = </a:t>
-            </a:r>
-            <a:r>
-              <a:rPr lang="en-AU" dirty="0" err="1" smtClean="0"/>
-              <a:t>EmptyModel</a:t>
-            </a:r>
-            <a:endParaRPr lang="en-AU" dirty="0" smtClean="0"/>
-          </a:p>
-          <a:p>
-            <a:r>
-              <a:rPr lang="en-AU" dirty="0" smtClean="0"/>
-              <a:t>WHILE node = </a:t>
-            </a:r>
-            <a:r>
-              <a:rPr lang="en-AU" dirty="0" err="1" smtClean="0"/>
-              <a:t>q.pop</a:t>
-            </a:r>
-            <a:endParaRPr lang="en-AU" dirty="0" smtClean="0"/>
-          </a:p>
-          <a:p>
-            <a:r>
-              <a:rPr lang="en-AU" dirty="0" smtClean="0"/>
-              <a:t>   IF visited(node)</a:t>
-            </a:r>
-          </a:p>
-          <a:p>
-            <a:r>
-              <a:rPr lang="en-AU" dirty="0" smtClean="0"/>
-              <a:t>      CONTINUE</a:t>
-            </a:r>
-          </a:p>
-          <a:p>
-            <a:r>
-              <a:rPr lang="en-AU" dirty="0" smtClean="0"/>
-              <a:t>   IF </a:t>
-            </a:r>
-            <a:r>
-              <a:rPr lang="en-AU" dirty="0" err="1" smtClean="0"/>
-              <a:t>partition+node</a:t>
-            </a:r>
-            <a:r>
-              <a:rPr lang="en-AU" dirty="0" smtClean="0"/>
-              <a:t> &gt; limits</a:t>
-            </a:r>
-          </a:p>
-          <a:p>
-            <a:r>
-              <a:rPr lang="en-AU" dirty="0" smtClean="0"/>
-              <a:t>      </a:t>
-            </a:r>
-            <a:r>
-              <a:rPr lang="en-AU" dirty="0" err="1" smtClean="0"/>
-              <a:t>WriteModelToNewFile</a:t>
-            </a:r>
-            <a:r>
-              <a:rPr lang="en-AU" dirty="0" smtClean="0"/>
-              <a:t>(partition)</a:t>
-            </a:r>
-          </a:p>
-          <a:p>
-            <a:r>
-              <a:rPr lang="en-AU" dirty="0" smtClean="0"/>
-              <a:t>      partition = </a:t>
-            </a:r>
-            <a:r>
-              <a:rPr lang="en-AU" dirty="0" err="1" smtClean="0"/>
-              <a:t>EmptyModel</a:t>
-            </a:r>
-            <a:endParaRPr lang="en-AU" dirty="0" smtClean="0"/>
-          </a:p>
-          <a:p>
-            <a:r>
-              <a:rPr lang="en-AU" dirty="0" smtClean="0"/>
-              <a:t>   </a:t>
-            </a:r>
-            <a:r>
-              <a:rPr lang="en-AU" dirty="0" err="1" smtClean="0"/>
-              <a:t>partition.Add</a:t>
-            </a:r>
-            <a:r>
-              <a:rPr lang="en-AU" dirty="0" smtClean="0"/>
-              <a:t>(node)</a:t>
-            </a:r>
-          </a:p>
-          <a:p>
-            <a:r>
-              <a:rPr lang="en-AU" dirty="0" smtClean="0"/>
-              <a:t>   FOREACH input in node-&gt;inputs</a:t>
-            </a:r>
-          </a:p>
-          <a:p>
-            <a:r>
-              <a:rPr lang="en-AU" dirty="0" smtClean="0"/>
-              <a:t>      </a:t>
-            </a:r>
-            <a:r>
-              <a:rPr lang="en-AU" dirty="0" err="1" smtClean="0"/>
-              <a:t>q.Add</a:t>
-            </a:r>
-            <a:r>
-              <a:rPr lang="en-AU" dirty="0" smtClean="0"/>
-              <a:t>(input-&gt;source)</a:t>
-            </a:r>
-          </a:p>
-          <a:p>
-            <a:r>
-              <a:rPr lang="en-AU" dirty="0" smtClean="0"/>
-              <a:t> </a:t>
-            </a:r>
-            <a:r>
-              <a:rPr lang="en-AU" dirty="0" err="1" smtClean="0"/>
-              <a:t>WriteModelToNewFile</a:t>
-            </a:r>
-            <a:r>
-              <a:rPr lang="en-AU" dirty="0" smtClean="0"/>
-              <a:t>(partition)</a:t>
-            </a:r>
-            <a:endParaRPr lang="en-AU" dirty="0" smtClean="0"/>
-          </a:p>
-          <a:p>
-            <a:endParaRPr lang="en-AU" dirty="0" smtClean="0"/>
-          </a:p>
-          <a:p>
-            <a:r>
-              <a:rPr lang="en-AU" dirty="0" smtClean="0"/>
-              <a:t>Model::Add(node)</a:t>
-            </a:r>
-          </a:p>
-          <a:p>
-            <a:r>
-              <a:rPr lang="en-AU" dirty="0" smtClean="0"/>
-              <a:t>   </a:t>
-            </a:r>
-            <a:r>
-              <a:rPr lang="en-AU" dirty="0" err="1" smtClean="0"/>
-              <a:t>nodeCollection.Add</a:t>
-            </a:r>
-            <a:r>
-              <a:rPr lang="en-AU" dirty="0" smtClean="0"/>
-              <a:t>(node)</a:t>
-            </a:r>
-          </a:p>
-          <a:p>
-            <a:r>
-              <a:rPr lang="en-AU" dirty="0" smtClean="0"/>
-              <a:t>   </a:t>
-            </a:r>
-            <a:r>
-              <a:rPr lang="en-AU" dirty="0" err="1" smtClean="0"/>
-              <a:t>UpdateSignals</a:t>
-            </a:r>
-            <a:r>
-              <a:rPr lang="en-AU" dirty="0" smtClean="0"/>
-              <a:t>(node)</a:t>
-            </a:r>
-          </a:p>
-          <a:p>
-            <a:r>
-              <a:rPr lang="en-AU" dirty="0" smtClean="0"/>
-              <a:t>   </a:t>
-            </a:r>
-            <a:r>
-              <a:rPr lang="en-AU" dirty="0" err="1" smtClean="0"/>
-              <a:t>inCost</a:t>
-            </a:r>
-            <a:r>
-              <a:rPr lang="en-AU" dirty="0" smtClean="0"/>
-              <a:t> = </a:t>
-            </a:r>
-            <a:r>
-              <a:rPr lang="en-AU" dirty="0" err="1" smtClean="0"/>
-              <a:t>MaxInputCost</a:t>
-            </a:r>
-            <a:endParaRPr lang="en-AU" dirty="0" smtClean="0"/>
-          </a:p>
-          <a:p>
-            <a:r>
-              <a:rPr lang="en-AU" dirty="0" smtClean="0"/>
-              <a:t>   </a:t>
-            </a:r>
-            <a:r>
-              <a:rPr lang="en-AU" dirty="0" err="1" smtClean="0"/>
-              <a:t>UpdateCosts</a:t>
-            </a:r>
-            <a:r>
-              <a:rPr lang="en-AU" dirty="0" smtClean="0"/>
-              <a:t>(node, </a:t>
-            </a:r>
-            <a:r>
-              <a:rPr lang="en-AU" dirty="0" err="1" smtClean="0"/>
-              <a:t>inCost</a:t>
-            </a:r>
-            <a:r>
-              <a:rPr lang="en-AU" dirty="0" smtClean="0"/>
-              <a:t>)</a:t>
-            </a:r>
-          </a:p>
-          <a:p>
-            <a:endParaRPr lang="en-AU" dirty="0" smtClean="0"/>
-          </a:p>
-          <a:p>
-            <a:r>
-              <a:rPr lang="en-AU" dirty="0" smtClean="0"/>
-              <a:t>Model::</a:t>
-            </a:r>
-            <a:r>
-              <a:rPr lang="en-AU" dirty="0" err="1" smtClean="0"/>
-              <a:t>UpdateCosts</a:t>
-            </a:r>
-            <a:r>
-              <a:rPr lang="en-AU" dirty="0" smtClean="0"/>
-              <a:t>(node, </a:t>
-            </a:r>
-            <a:r>
-              <a:rPr lang="en-AU" dirty="0" err="1" smtClean="0"/>
-              <a:t>inCost</a:t>
-            </a:r>
-            <a:r>
-              <a:rPr lang="en-AU" dirty="0" smtClean="0"/>
-              <a:t>)</a:t>
-            </a:r>
-          </a:p>
-          <a:p>
-            <a:r>
-              <a:rPr lang="en-AU" dirty="0" smtClean="0"/>
-              <a:t>   </a:t>
-            </a:r>
-            <a:r>
-              <a:rPr lang="en-AU" dirty="0" err="1" smtClean="0"/>
-              <a:t>nodeCost</a:t>
-            </a:r>
-            <a:r>
-              <a:rPr lang="en-AU" dirty="0" smtClean="0"/>
-              <a:t> = </a:t>
-            </a:r>
-            <a:r>
-              <a:rPr lang="en-AU" dirty="0" err="1" smtClean="0"/>
-              <a:t>inCost+InnateCost</a:t>
-            </a:r>
-            <a:endParaRPr lang="en-AU" dirty="0" smtClean="0"/>
-          </a:p>
-          <a:p>
-            <a:r>
-              <a:rPr lang="en-AU" dirty="0" smtClean="0"/>
-              <a:t>   </a:t>
-            </a:r>
-            <a:r>
-              <a:rPr lang="en-AU" dirty="0" err="1" smtClean="0"/>
-              <a:t>MarkVisited</a:t>
-            </a:r>
-            <a:r>
-              <a:rPr lang="en-AU" dirty="0" smtClean="0"/>
-              <a:t>(node)</a:t>
-            </a:r>
-          </a:p>
-          <a:p>
-            <a:r>
-              <a:rPr lang="en-AU" dirty="0" smtClean="0"/>
-              <a:t>   FOREACH sink in node-&gt;sinks</a:t>
-            </a:r>
-          </a:p>
-          <a:p>
-            <a:r>
-              <a:rPr lang="en-AU" dirty="0" smtClean="0"/>
-              <a:t>      IF visited(sink)</a:t>
-            </a:r>
-          </a:p>
-          <a:p>
-            <a:r>
-              <a:rPr lang="en-AU" dirty="0" smtClean="0"/>
-              <a:t>         Cut(node, sink)</a:t>
-            </a:r>
-          </a:p>
-          <a:p>
-            <a:r>
-              <a:rPr lang="en-AU" dirty="0" smtClean="0"/>
-              <a:t>      ELSE</a:t>
-            </a:r>
-          </a:p>
-          <a:p>
-            <a:r>
-              <a:rPr lang="en-AU" dirty="0" smtClean="0"/>
-              <a:t>         </a:t>
-            </a:r>
-            <a:r>
-              <a:rPr lang="en-AU" dirty="0" err="1" smtClean="0"/>
-              <a:t>UpdateCosts</a:t>
-            </a:r>
-            <a:r>
-              <a:rPr lang="en-AU" dirty="0" smtClean="0"/>
-              <a:t>(sink, </a:t>
-            </a:r>
-            <a:r>
-              <a:rPr lang="en-AU" dirty="0" err="1" smtClean="0"/>
-              <a:t>nodeCost</a:t>
-            </a:r>
-            <a:r>
-              <a:rPr lang="en-AU" dirty="0" smtClean="0"/>
-              <a:t>)</a:t>
-            </a:r>
-          </a:p>
-          <a:p>
-            <a:r>
-              <a:rPr lang="en-AU" dirty="0" smtClean="0"/>
-              <a:t>         </a:t>
-            </a:r>
-          </a:p>
-          <a:p>
-            <a:r>
-              <a:rPr lang="en-AU" dirty="0" smtClean="0"/>
-              <a:t>//Rename the signals, then after TMR we can </a:t>
-            </a:r>
-            <a:r>
-              <a:rPr lang="en-AU" dirty="0" err="1" smtClean="0"/>
-              <a:t>rejoin</a:t>
-            </a:r>
-            <a:r>
-              <a:rPr lang="en-AU" dirty="0" smtClean="0"/>
-              <a:t> them outside the partition</a:t>
-            </a:r>
-          </a:p>
-          <a:p>
-            <a:r>
-              <a:rPr lang="en-AU" dirty="0" smtClean="0"/>
-              <a:t>Model::Cut(source, sink)</a:t>
-            </a:r>
-          </a:p>
-          <a:p>
-            <a:r>
-              <a:rPr lang="en-AU" dirty="0" smtClean="0"/>
-              <a:t>   source-&gt;output = "</a:t>
-            </a:r>
-            <a:r>
-              <a:rPr lang="en-AU" dirty="0" err="1" smtClean="0"/>
-              <a:t>SpecialOut</a:t>
-            </a:r>
-            <a:r>
-              <a:rPr lang="en-AU" dirty="0" smtClean="0"/>
-              <a:t>"+source-&gt;output</a:t>
-            </a:r>
-          </a:p>
-          <a:p>
-            <a:r>
-              <a:rPr lang="en-AU" dirty="0" smtClean="0"/>
-              <a:t>   sink-&gt;inputs[source-&gt;output] = "</a:t>
-            </a:r>
-            <a:r>
-              <a:rPr lang="en-AU" dirty="0" err="1" smtClean="0"/>
-              <a:t>SpecialIn"source</a:t>
-            </a:r>
-            <a:r>
-              <a:rPr lang="en-AU" dirty="0" smtClean="0"/>
-              <a:t>-&gt;output</a:t>
-            </a:r>
-          </a:p>
-          <a:p>
-            <a:r>
-              <a:rPr lang="en-AU" dirty="0" smtClean="0"/>
-              <a:t>   </a:t>
-            </a:r>
-            <a:r>
-              <a:rPr lang="en-AU" dirty="0" err="1" smtClean="0"/>
-              <a:t>Model.AddInput</a:t>
-            </a:r>
-            <a:r>
-              <a:rPr lang="en-AU" dirty="0" smtClean="0"/>
-              <a:t>("</a:t>
-            </a:r>
-            <a:r>
-              <a:rPr lang="en-AU" dirty="0" err="1" smtClean="0"/>
-              <a:t>SpecialIn"source</a:t>
-            </a:r>
-            <a:r>
-              <a:rPr lang="en-AU" dirty="0" smtClean="0"/>
-              <a:t>-&gt;output)</a:t>
-            </a:r>
-          </a:p>
-          <a:p>
-            <a:r>
-              <a:rPr lang="en-AU" dirty="0" smtClean="0"/>
-              <a:t>   </a:t>
-            </a:r>
-            <a:r>
-              <a:rPr lang="en-AU" dirty="0" err="1" smtClean="0"/>
-              <a:t>Model.AddOutput</a:t>
-            </a:r>
-            <a:r>
-              <a:rPr lang="en-AU" dirty="0" smtClean="0"/>
-              <a:t>("</a:t>
-            </a:r>
-            <a:r>
-              <a:rPr lang="en-AU" dirty="0" err="1" smtClean="0"/>
-              <a:t>SpecialOut</a:t>
-            </a:r>
-            <a:r>
-              <a:rPr lang="en-AU" dirty="0" smtClean="0"/>
-              <a:t>"+source-&gt;output)</a:t>
-            </a:r>
-            <a:endParaRPr lang="en-AU" dirty="0"/>
-          </a:p>
-        </p:txBody>
-      </p:sp>
+      </p:pic>
     </p:spTree>
     <p:extLst>
       <p:ext uri="{BB962C8B-B14F-4D97-AF65-F5344CB8AC3E}">
-        <p14:creationId xmlns:p14="http://schemas.microsoft.com/office/powerpoint/2010/main" val="1554047530"/>
+        <p14:creationId xmlns:p14="http://schemas.microsoft.com/office/powerpoint/2010/main" val="3041793349"/>
       </p:ext>
     </p:extLst>
   </p:cSld>
@@ -4301,7 +4756,7 @@
           <a:p>
             <a:r>
               <a:rPr lang="en-AU" dirty="0" smtClean="0"/>
-              <a:t>Results</a:t>
+              <a:t>Example – End Result</a:t>
             </a:r>
             <a:endParaRPr lang="en-AU" dirty="0"/>
           </a:p>
@@ -4319,55 +4774,718 @@
         </p:nvSpPr>
         <p:spPr/>
         <p:txBody>
-          <a:bodyPr>
-            <a:normAutofit/>
+          <a:bodyPr numCol="2">
+            <a:normAutofit fontScale="32500" lnSpcReduction="20000"/>
           </a:bodyPr>
           <a:lstStyle/>
           <a:p>
-            <a:r>
-              <a:rPr lang="en-AU" dirty="0" smtClean="0"/>
-              <a:t>Use very small partitions, to magnify effect.</a:t>
-            </a:r>
-          </a:p>
-          <a:p>
-            <a:r>
-              <a:rPr lang="en-AU" dirty="0" smtClean="0"/>
-              <a:t>Routing is still the dominant contributor to time spent in workflow.</a:t>
-            </a:r>
-          </a:p>
-          <a:p>
-            <a:r>
-              <a:rPr lang="en-AU" dirty="0" smtClean="0"/>
-              <a:t>Latency from 10%-80% increase.</a:t>
-            </a:r>
-          </a:p>
-          <a:p>
-            <a:r>
-              <a:rPr lang="en-AU" dirty="0" smtClean="0"/>
-              <a:t>Area, number of elements, </a:t>
-            </a:r>
-            <a:r>
-              <a:rPr lang="en-AU" dirty="0" err="1" smtClean="0"/>
-              <a:t>etc</a:t>
-            </a:r>
-            <a:r>
-              <a:rPr lang="en-AU" dirty="0" smtClean="0"/>
-              <a:t>, all more or less triple.</a:t>
-            </a:r>
-          </a:p>
-          <a:p>
-            <a:r>
-              <a:rPr lang="en-AU" dirty="0" smtClean="0"/>
-              <a:t>Number of nets on the critical path usually increases, sometimes decreases.</a:t>
-            </a:r>
+            <a:pPr marL="0" indent="0">
+              <a:buNone/>
+            </a:pPr>
+            <a:r>
+              <a:rPr lang="en-AU" dirty="0"/>
+              <a:t># Benchmark "main" written by ABC on Wed Mar 13 02:18:50 2013</a:t>
+            </a:r>
+          </a:p>
+          <a:p>
+            <a:pPr marL="0" indent="0">
+              <a:buNone/>
+            </a:pPr>
+            <a:r>
+              <a:rPr lang="en-AU" dirty="0"/>
+              <a:t>.model main</a:t>
+            </a:r>
+          </a:p>
+          <a:p>
+            <a:pPr marL="0" indent="0">
+              <a:buNone/>
+            </a:pPr>
+            <a:r>
+              <a:rPr lang="en-AU" dirty="0"/>
+              <a:t>.inputs a b c</a:t>
+            </a:r>
+          </a:p>
+          <a:p>
+            <a:pPr marL="0" indent="0">
+              <a:buNone/>
+            </a:pPr>
+            <a:r>
+              <a:rPr lang="en-AU" dirty="0"/>
+              <a:t>.outputs x y z</a:t>
+            </a:r>
+          </a:p>
+          <a:p>
+            <a:pPr marL="0" indent="0">
+              <a:buNone/>
+            </a:pPr>
             <a:endParaRPr lang="en-AU" dirty="0"/>
+          </a:p>
+          <a:p>
+            <a:pPr marL="0" indent="0">
+              <a:buNone/>
+            </a:pPr>
+            <a:r>
+              <a:rPr lang="en-AU" dirty="0"/>
+              <a:t>.latch        n31 main|p1output(1)|[qq40]  2</a:t>
+            </a:r>
+          </a:p>
+          <a:p>
+            <a:pPr marL="0" indent="0">
+              <a:buNone/>
+            </a:pPr>
+            <a:r>
+              <a:rPr lang="en-AU" dirty="0"/>
+              <a:t>.latch        n34 main|p1output(1)|[qq10]  2</a:t>
+            </a:r>
+          </a:p>
+          <a:p>
+            <a:pPr marL="0" indent="0">
+              <a:buNone/>
+            </a:pPr>
+            <a:r>
+              <a:rPr lang="en-AU" dirty="0"/>
+              <a:t>.latch        n40 main|p1output(1)|[qq41]  2</a:t>
+            </a:r>
+          </a:p>
+          <a:p>
+            <a:pPr marL="0" indent="0">
+              <a:buNone/>
+            </a:pPr>
+            <a:r>
+              <a:rPr lang="en-AU" dirty="0"/>
+              <a:t>.latch        n43 main|p1output(1)|[qq11]  2</a:t>
+            </a:r>
+          </a:p>
+          <a:p>
+            <a:pPr marL="0" indent="0">
+              <a:buNone/>
+            </a:pPr>
+            <a:r>
+              <a:rPr lang="en-AU" dirty="0"/>
+              <a:t>.latch        n49 main|p1output(1)|[qq42]  2</a:t>
+            </a:r>
+          </a:p>
+          <a:p>
+            <a:pPr marL="0" indent="0">
+              <a:buNone/>
+            </a:pPr>
+            <a:r>
+              <a:rPr lang="en-AU" dirty="0"/>
+              <a:t>.latch        n52 main|p1output(1)|[qq12]  2</a:t>
+            </a:r>
+          </a:p>
+          <a:p>
+            <a:pPr marL="0" indent="0">
+              <a:buNone/>
+            </a:pPr>
+            <a:endParaRPr lang="en-AU" dirty="0"/>
+          </a:p>
+          <a:p>
+            <a:pPr marL="0" indent="0">
+              <a:buNone/>
+            </a:pPr>
+            <a:r>
+              <a:rPr lang="en-AU" dirty="0"/>
+              <a:t>.names a b n25</a:t>
+            </a:r>
+          </a:p>
+          <a:p>
+            <a:pPr marL="0" indent="0">
+              <a:buNone/>
+            </a:pPr>
+            <a:r>
+              <a:rPr lang="en-AU" dirty="0"/>
+              <a:t>11 1</a:t>
+            </a:r>
+          </a:p>
+          <a:p>
+            <a:pPr marL="0" indent="0">
+              <a:buNone/>
+            </a:pPr>
+            <a:r>
+              <a:rPr lang="en-AU" dirty="0"/>
+              <a:t>.names c main|p1output(1)|[qq10] n26</a:t>
+            </a:r>
+          </a:p>
+          <a:p>
+            <a:pPr marL="0" indent="0">
+              <a:buNone/>
+            </a:pPr>
+            <a:r>
+              <a:rPr lang="en-AU" dirty="0"/>
+              <a:t>11 1</a:t>
+            </a:r>
+          </a:p>
+          <a:p>
+            <a:pPr marL="0" indent="0">
+              <a:buNone/>
+            </a:pPr>
+            <a:r>
+              <a:rPr lang="en-AU" dirty="0"/>
+              <a:t>.names a b n31</a:t>
+            </a:r>
+          </a:p>
+          <a:p>
+            <a:pPr marL="0" indent="0">
+              <a:buNone/>
+            </a:pPr>
+            <a:r>
+              <a:rPr lang="en-AU" dirty="0"/>
+              <a:t>10 1</a:t>
+            </a:r>
+          </a:p>
+          <a:p>
+            <a:pPr marL="0" indent="0">
+              <a:buNone/>
+            </a:pPr>
+            <a:r>
+              <a:rPr lang="en-AU" dirty="0"/>
+              <a:t>01 1</a:t>
+            </a:r>
+          </a:p>
+          <a:p>
+            <a:pPr marL="0" indent="0">
+              <a:buNone/>
+            </a:pPr>
+            <a:r>
+              <a:rPr lang="en-AU" dirty="0"/>
+              <a:t>.names a b n28</a:t>
+            </a:r>
+          </a:p>
+          <a:p>
+            <a:pPr marL="0" indent="0">
+              <a:buNone/>
+            </a:pPr>
+            <a:r>
+              <a:rPr lang="en-AU" dirty="0"/>
+              <a:t>11 1</a:t>
+            </a:r>
+          </a:p>
+          <a:p>
+            <a:pPr marL="0" indent="0">
+              <a:buNone/>
+            </a:pPr>
+            <a:r>
+              <a:rPr lang="en-AU" dirty="0"/>
+              <a:t>.names c main|p1output(1)|[qq11] n29</a:t>
+            </a:r>
+          </a:p>
+          <a:p>
+            <a:pPr marL="0" indent="0">
+              <a:buNone/>
+            </a:pPr>
+            <a:r>
+              <a:rPr lang="en-AU" dirty="0"/>
+              <a:t>11 1</a:t>
+            </a:r>
+          </a:p>
+          <a:p>
+            <a:pPr marL="0" indent="0">
+              <a:buNone/>
+            </a:pPr>
+            <a:r>
+              <a:rPr lang="en-AU" dirty="0"/>
+              <a:t>.names a b n40</a:t>
+            </a:r>
+          </a:p>
+          <a:p>
+            <a:pPr marL="0" indent="0">
+              <a:buNone/>
+            </a:pPr>
+            <a:r>
+              <a:rPr lang="en-AU" dirty="0"/>
+              <a:t>10 1</a:t>
+            </a:r>
+          </a:p>
+          <a:p>
+            <a:pPr marL="0" indent="0">
+              <a:buNone/>
+            </a:pPr>
+            <a:r>
+              <a:rPr lang="en-AU" dirty="0"/>
+              <a:t>01 1</a:t>
+            </a:r>
+          </a:p>
+          <a:p>
+            <a:pPr marL="0" indent="0">
+              <a:buNone/>
+            </a:pPr>
+            <a:r>
+              <a:rPr lang="en-AU" dirty="0"/>
+              <a:t>.names a b n31_1</a:t>
+            </a:r>
+          </a:p>
+          <a:p>
+            <a:pPr marL="0" indent="0">
+              <a:buNone/>
+            </a:pPr>
+            <a:r>
+              <a:rPr lang="en-AU" dirty="0"/>
+              <a:t>11 1</a:t>
+            </a:r>
+          </a:p>
+          <a:p>
+            <a:pPr marL="0" indent="0">
+              <a:buNone/>
+            </a:pPr>
+            <a:r>
+              <a:rPr lang="en-AU" dirty="0"/>
+              <a:t>.names c main|p1output(1)|[qq12] n32_1</a:t>
+            </a:r>
+          </a:p>
+          <a:p>
+            <a:pPr marL="0" indent="0">
+              <a:buNone/>
+            </a:pPr>
+            <a:r>
+              <a:rPr lang="en-AU" dirty="0"/>
+              <a:t>11 1</a:t>
+            </a:r>
+          </a:p>
+          <a:p>
+            <a:pPr marL="0" indent="0">
+              <a:buNone/>
+            </a:pPr>
+            <a:r>
+              <a:rPr lang="en-AU" dirty="0"/>
+              <a:t>.names a b n49</a:t>
+            </a:r>
+          </a:p>
+          <a:p>
+            <a:pPr marL="0" indent="0">
+              <a:buNone/>
+            </a:pPr>
+            <a:r>
+              <a:rPr lang="en-AU" dirty="0"/>
+              <a:t>10 1</a:t>
+            </a:r>
+          </a:p>
+          <a:p>
+            <a:pPr marL="0" indent="0">
+              <a:buNone/>
+            </a:pPr>
+            <a:r>
+              <a:rPr lang="en-AU" dirty="0"/>
+              <a:t>01 1</a:t>
+            </a:r>
+          </a:p>
+          <a:p>
+            <a:pPr marL="0" indent="0">
+              <a:buNone/>
+            </a:pPr>
+            <a:r>
+              <a:rPr lang="en-AU" dirty="0"/>
+              <a:t>.names n26 n29 n32_1 z</a:t>
+            </a:r>
+          </a:p>
+          <a:p>
+            <a:pPr marL="0" indent="0">
+              <a:buNone/>
+            </a:pPr>
+            <a:r>
+              <a:rPr lang="en-AU" dirty="0"/>
+              <a:t>11- 1</a:t>
+            </a:r>
+          </a:p>
+          <a:p>
+            <a:pPr marL="0" indent="0">
+              <a:buNone/>
+            </a:pPr>
+            <a:r>
+              <a:rPr lang="en-AU" dirty="0"/>
+              <a:t>1-1 1</a:t>
+            </a:r>
+          </a:p>
+          <a:p>
+            <a:pPr marL="0" indent="0">
+              <a:buNone/>
+            </a:pPr>
+            <a:r>
+              <a:rPr lang="en-AU" dirty="0"/>
+              <a:t>--1 1</a:t>
+            </a:r>
+          </a:p>
+          <a:p>
+            <a:pPr marL="0" indent="0">
+              <a:buNone/>
+            </a:pPr>
+            <a:r>
+              <a:rPr lang="en-AU" dirty="0"/>
+              <a:t>.names n25 n28 n31_1 x</a:t>
+            </a:r>
+          </a:p>
+          <a:p>
+            <a:pPr marL="0" indent="0">
+              <a:buNone/>
+            </a:pPr>
+            <a:r>
+              <a:rPr lang="en-AU" dirty="0"/>
+              <a:t>11- 1</a:t>
+            </a:r>
+          </a:p>
+          <a:p>
+            <a:pPr marL="0" indent="0">
+              <a:buNone/>
+            </a:pPr>
+            <a:r>
+              <a:rPr lang="en-AU" dirty="0"/>
+              <a:t>1-1 1</a:t>
+            </a:r>
+          </a:p>
+          <a:p>
+            <a:pPr marL="0" indent="0">
+              <a:buNone/>
+            </a:pPr>
+            <a:r>
+              <a:rPr lang="en-AU" dirty="0"/>
+              <a:t>--1 1</a:t>
+            </a:r>
+          </a:p>
+          <a:p>
+            <a:pPr marL="0" indent="0">
+              <a:buNone/>
+            </a:pPr>
+            <a:r>
+              <a:rPr lang="en-AU" dirty="0"/>
+              <a:t>.names main|p1output(1)|[qq40] main|p1output(1)|[qq41] \</a:t>
+            </a:r>
+          </a:p>
+          <a:p>
+            <a:pPr marL="0" indent="0">
+              <a:buNone/>
+            </a:pPr>
+            <a:r>
+              <a:rPr lang="en-AU" dirty="0"/>
+              <a:t> main|p1output(1)|[qq42] y</a:t>
+            </a:r>
+          </a:p>
+          <a:p>
+            <a:pPr marL="0" indent="0">
+              <a:buNone/>
+            </a:pPr>
+            <a:r>
+              <a:rPr lang="en-AU" dirty="0"/>
+              <a:t>11- 1</a:t>
+            </a:r>
+          </a:p>
+          <a:p>
+            <a:pPr marL="0" indent="0">
+              <a:buNone/>
+            </a:pPr>
+            <a:r>
+              <a:rPr lang="en-AU" dirty="0"/>
+              <a:t>1-1 1</a:t>
+            </a:r>
+          </a:p>
+          <a:p>
+            <a:pPr marL="0" indent="0">
+              <a:buNone/>
+            </a:pPr>
+            <a:r>
+              <a:rPr lang="en-AU" dirty="0"/>
+              <a:t>--1 1</a:t>
+            </a:r>
+          </a:p>
+          <a:p>
+            <a:pPr marL="0" indent="0">
+              <a:buNone/>
+            </a:pPr>
+            <a:r>
+              <a:rPr lang="en-AU" dirty="0"/>
+              <a:t>.names main|p1output(1)|[qq10] n34</a:t>
+            </a:r>
+          </a:p>
+          <a:p>
+            <a:pPr marL="0" indent="0">
+              <a:buNone/>
+            </a:pPr>
+            <a:r>
+              <a:rPr lang="en-AU" dirty="0"/>
+              <a:t>1 1</a:t>
+            </a:r>
+          </a:p>
+          <a:p>
+            <a:pPr marL="0" indent="0">
+              <a:buNone/>
+            </a:pPr>
+            <a:r>
+              <a:rPr lang="en-AU" dirty="0"/>
+              <a:t>.names main|p1output(1)|[qq11] n43</a:t>
+            </a:r>
+          </a:p>
+          <a:p>
+            <a:pPr marL="0" indent="0">
+              <a:buNone/>
+            </a:pPr>
+            <a:r>
+              <a:rPr lang="en-AU" dirty="0"/>
+              <a:t>1 1</a:t>
+            </a:r>
+          </a:p>
+          <a:p>
+            <a:pPr marL="0" indent="0">
+              <a:buNone/>
+            </a:pPr>
+            <a:r>
+              <a:rPr lang="en-AU" dirty="0"/>
+              <a:t>.names main|p1output(1)|[qq12] n52</a:t>
+            </a:r>
+          </a:p>
+          <a:p>
+            <a:pPr marL="0" indent="0">
+              <a:buNone/>
+            </a:pPr>
+            <a:r>
+              <a:rPr lang="en-AU" dirty="0"/>
+              <a:t>1 1</a:t>
+            </a:r>
+          </a:p>
+          <a:p>
+            <a:pPr marL="0" indent="0">
+              <a:buNone/>
+            </a:pPr>
+            <a:r>
+              <a:rPr lang="en-AU" dirty="0"/>
+              <a:t>.end</a:t>
+            </a:r>
           </a:p>
         </p:txBody>
       </p:sp>
     </p:spTree>
     <p:extLst>
       <p:ext uri="{BB962C8B-B14F-4D97-AF65-F5344CB8AC3E}">
-        <p14:creationId xmlns:p14="http://schemas.microsoft.com/office/powerpoint/2010/main" val="1647370932"/>
+        <p14:creationId xmlns:p14="http://schemas.microsoft.com/office/powerpoint/2010/main" val="2960072589"/>
+      </p:ext>
+    </p:extLst>
+  </p:cSld>
+  <p:clrMapOvr>
+    <a:masterClrMapping/>
+  </p:clrMapOvr>
+</p:sld>
+</file>
+
+<file path=ppt/slides/slide8.xml><?xml version="1.0" encoding="utf-8"?>
+<p:sld xmlns:a="http://schemas.openxmlformats.org/drawingml/2006/main" xmlns:r="http://schemas.openxmlformats.org/officeDocument/2006/relationships" xmlns:p="http://schemas.openxmlformats.org/presentationml/2006/main">
+  <p:cSld>
+    <p:spTree>
+      <p:nvGrpSpPr>
+        <p:cNvPr id="1" name=""/>
+        <p:cNvGrpSpPr/>
+        <p:nvPr/>
+      </p:nvGrpSpPr>
+      <p:grpSpPr>
+        <a:xfrm>
+          <a:off x="0" y="0"/>
+          <a:ext cx="0" cy="0"/>
+          <a:chOff x="0" y="0"/>
+          <a:chExt cx="0" cy="0"/>
+        </a:xfrm>
+      </p:grpSpPr>
+      <p:sp>
+        <p:nvSpPr>
+          <p:cNvPr id="2" name="Title 1"/>
+          <p:cNvSpPr>
+            <a:spLocks noGrp="1"/>
+          </p:cNvSpPr>
+          <p:nvPr>
+            <p:ph type="title"/>
+          </p:nvPr>
+        </p:nvSpPr>
+        <p:spPr/>
+        <p:txBody>
+          <a:bodyPr/>
+          <a:lstStyle/>
+          <a:p>
+            <a:r>
+              <a:rPr lang="en-AU" dirty="0" smtClean="0"/>
+              <a:t>Algorithm</a:t>
+            </a:r>
+            <a:endParaRPr lang="en-AU" dirty="0"/>
+          </a:p>
+        </p:txBody>
+      </p:sp>
+      <p:sp>
+        <p:nvSpPr>
+          <p:cNvPr id="3" name="Content Placeholder 2"/>
+          <p:cNvSpPr>
+            <a:spLocks noGrp="1"/>
+          </p:cNvSpPr>
+          <p:nvPr>
+            <p:ph idx="1"/>
+          </p:nvPr>
+        </p:nvSpPr>
+        <p:spPr/>
+        <p:txBody>
+          <a:bodyPr>
+            <a:normAutofit fontScale="85000" lnSpcReduction="10000"/>
+          </a:bodyPr>
+          <a:lstStyle/>
+          <a:p>
+            <a:r>
+              <a:rPr lang="en-AU" dirty="0" smtClean="0"/>
+              <a:t>1. Read entire file into memory, and represent it as a graph.</a:t>
+            </a:r>
+          </a:p>
+          <a:p>
+            <a:r>
+              <a:rPr lang="en-AU" dirty="0" smtClean="0"/>
+              <a:t>Each Model has a list of nodes and map of           </a:t>
+            </a:r>
+            <a:r>
+              <a:rPr lang="en-AU" dirty="0" err="1" smtClean="0"/>
+              <a:t>signalName</a:t>
+            </a:r>
+            <a:r>
+              <a:rPr lang="en-AU" dirty="0" smtClean="0"/>
+              <a:t>-&gt;Signal</a:t>
+            </a:r>
+          </a:p>
+          <a:p>
+            <a:r>
+              <a:rPr lang="en-AU" dirty="0" smtClean="0"/>
+              <a:t>Each signal points to its source and sinks</a:t>
+            </a:r>
+          </a:p>
+          <a:p>
+            <a:r>
+              <a:rPr lang="en-AU" dirty="0" smtClean="0"/>
+              <a:t>Each node has a list (string) of inputs and outputs (+type, </a:t>
+            </a:r>
+            <a:r>
+              <a:rPr lang="en-AU" dirty="0" err="1" smtClean="0"/>
+              <a:t>etc</a:t>
+            </a:r>
+            <a:r>
+              <a:rPr lang="en-AU" dirty="0" smtClean="0"/>
+              <a:t>).</a:t>
+            </a:r>
+          </a:p>
+          <a:p>
+            <a:r>
+              <a:rPr lang="en-AU" dirty="0" smtClean="0"/>
+              <a:t>Why do nodes have strings, which are looked up in a map to the signal, which points to the node? Why not have each node just point to the other node? Because of the way models are made and manipulated.</a:t>
+            </a:r>
+          </a:p>
+        </p:txBody>
+      </p:sp>
+    </p:spTree>
+    <p:extLst>
+      <p:ext uri="{BB962C8B-B14F-4D97-AF65-F5344CB8AC3E}">
+        <p14:creationId xmlns:p14="http://schemas.microsoft.com/office/powerpoint/2010/main" val="109906193"/>
+      </p:ext>
+    </p:extLst>
+  </p:cSld>
+  <p:clrMapOvr>
+    <a:masterClrMapping/>
+  </p:clrMapOvr>
+</p:sld>
+</file>
+
+<file path=ppt/slides/slide9.xml><?xml version="1.0" encoding="utf-8"?>
+<p:sld xmlns:a="http://schemas.openxmlformats.org/drawingml/2006/main" xmlns:r="http://schemas.openxmlformats.org/officeDocument/2006/relationships" xmlns:p="http://schemas.openxmlformats.org/presentationml/2006/main">
+  <p:cSld>
+    <p:spTree>
+      <p:nvGrpSpPr>
+        <p:cNvPr id="1" name=""/>
+        <p:cNvGrpSpPr/>
+        <p:nvPr/>
+      </p:nvGrpSpPr>
+      <p:grpSpPr>
+        <a:xfrm>
+          <a:off x="0" y="0"/>
+          <a:ext cx="0" cy="0"/>
+          <a:chOff x="0" y="0"/>
+          <a:chExt cx="0" cy="0"/>
+        </a:xfrm>
+      </p:grpSpPr>
+      <p:sp>
+        <p:nvSpPr>
+          <p:cNvPr id="2" name="Title 1"/>
+          <p:cNvSpPr>
+            <a:spLocks noGrp="1"/>
+          </p:cNvSpPr>
+          <p:nvPr>
+            <p:ph type="title"/>
+          </p:nvPr>
+        </p:nvSpPr>
+        <p:spPr/>
+        <p:txBody>
+          <a:bodyPr/>
+          <a:lstStyle/>
+          <a:p>
+            <a:r>
+              <a:rPr lang="en-AU" dirty="0" smtClean="0"/>
+              <a:t>Algorithm 2</a:t>
+            </a:r>
+            <a:endParaRPr lang="en-AU" dirty="0"/>
+          </a:p>
+        </p:txBody>
+      </p:sp>
+      <p:sp>
+        <p:nvSpPr>
+          <p:cNvPr id="3" name="Content Placeholder 2"/>
+          <p:cNvSpPr>
+            <a:spLocks noGrp="1"/>
+          </p:cNvSpPr>
+          <p:nvPr>
+            <p:ph idx="1"/>
+          </p:nvPr>
+        </p:nvSpPr>
+        <p:spPr/>
+        <p:txBody>
+          <a:bodyPr>
+            <a:normAutofit fontScale="85000" lnSpcReduction="10000"/>
+          </a:bodyPr>
+          <a:lstStyle/>
+          <a:p>
+            <a:r>
+              <a:rPr lang="en-AU" dirty="0" smtClean="0"/>
+              <a:t>2. Traverse</a:t>
+            </a:r>
+          </a:p>
+          <a:p>
+            <a:r>
+              <a:rPr lang="en-AU" dirty="0" smtClean="0"/>
+              <a:t>Start at one end, adding connected nodes to partition. Once partition reaches limit, write it out, remove those nodes from the network, and repeat.</a:t>
+            </a:r>
+          </a:p>
+          <a:p>
+            <a:r>
+              <a:rPr lang="en-AU" dirty="0" smtClean="0"/>
+              <a:t>Specifically, start at outputs not inputs due to e.g. [IMAGE]</a:t>
+            </a:r>
+          </a:p>
+          <a:p>
+            <a:r>
+              <a:rPr lang="en-AU" dirty="0" smtClean="0"/>
+              <a:t>3. Adding to Partition</a:t>
+            </a:r>
+          </a:p>
+          <a:p>
+            <a:r>
+              <a:rPr lang="en-AU" dirty="0" smtClean="0"/>
+              <a:t>Add to node collection</a:t>
+            </a:r>
+          </a:p>
+          <a:p>
+            <a:r>
+              <a:rPr lang="en-AU" dirty="0" smtClean="0"/>
+              <a:t>Update Signals</a:t>
+            </a:r>
+          </a:p>
+          <a:p>
+            <a:r>
+              <a:rPr lang="en-AU" dirty="0" smtClean="0"/>
+              <a:t>Recalculate critical path (max cost without cycles)</a:t>
+            </a:r>
+            <a:endParaRPr lang="en-AU" dirty="0"/>
+          </a:p>
+        </p:txBody>
+      </p:sp>
+    </p:spTree>
+    <p:extLst>
+      <p:ext uri="{BB962C8B-B14F-4D97-AF65-F5344CB8AC3E}">
+        <p14:creationId xmlns:p14="http://schemas.microsoft.com/office/powerpoint/2010/main" val="3157154842"/>
       </p:ext>
     </p:extLst>
   </p:cSld>

</xml_diff>

<commit_message>
Added algorithm description of cycle detection
</commit_message>
<xml_diff>
--- a/Partitioning Algorithm and Initial Results.pptx
+++ b/Partitioning Algorithm and Initial Results.pptx
@@ -15,7 +15,9 @@
     <p:sldId id="257" r:id="rId9"/>
     <p:sldId id="259" r:id="rId10"/>
     <p:sldId id="260" r:id="rId11"/>
-    <p:sldId id="261" r:id="rId12"/>
+    <p:sldId id="267" r:id="rId12"/>
+    <p:sldId id="268" r:id="rId13"/>
+    <p:sldId id="261" r:id="rId14"/>
   </p:sldIdLst>
   <p:sldSz cx="9144000" cy="6858000" type="screen4x3"/>
   <p:notesSz cx="6858000" cy="9144000"/>
@@ -298,7 +300,7 @@
           <a:p>
             <a:fld id="{9674196C-5CA3-4053-8720-8066237EE849}" type="datetimeFigureOut">
               <a:rPr lang="en-AU" smtClean="0"/>
-              <a:t>18/03/2013</a:t>
+              <a:t>20/03/2013</a:t>
             </a:fld>
             <a:endParaRPr lang="en-AU"/>
           </a:p>
@@ -468,7 +470,7 @@
           <a:p>
             <a:fld id="{9674196C-5CA3-4053-8720-8066237EE849}" type="datetimeFigureOut">
               <a:rPr lang="en-AU" smtClean="0"/>
-              <a:t>18/03/2013</a:t>
+              <a:t>20/03/2013</a:t>
             </a:fld>
             <a:endParaRPr lang="en-AU"/>
           </a:p>
@@ -648,7 +650,7 @@
           <a:p>
             <a:fld id="{9674196C-5CA3-4053-8720-8066237EE849}" type="datetimeFigureOut">
               <a:rPr lang="en-AU" smtClean="0"/>
-              <a:t>18/03/2013</a:t>
+              <a:t>20/03/2013</a:t>
             </a:fld>
             <a:endParaRPr lang="en-AU"/>
           </a:p>
@@ -818,7 +820,7 @@
           <a:p>
             <a:fld id="{9674196C-5CA3-4053-8720-8066237EE849}" type="datetimeFigureOut">
               <a:rPr lang="en-AU" smtClean="0"/>
-              <a:t>18/03/2013</a:t>
+              <a:t>20/03/2013</a:t>
             </a:fld>
             <a:endParaRPr lang="en-AU"/>
           </a:p>
@@ -1064,7 +1066,7 @@
           <a:p>
             <a:fld id="{9674196C-5CA3-4053-8720-8066237EE849}" type="datetimeFigureOut">
               <a:rPr lang="en-AU" smtClean="0"/>
-              <a:t>18/03/2013</a:t>
+              <a:t>20/03/2013</a:t>
             </a:fld>
             <a:endParaRPr lang="en-AU"/>
           </a:p>
@@ -1352,7 +1354,7 @@
           <a:p>
             <a:fld id="{9674196C-5CA3-4053-8720-8066237EE849}" type="datetimeFigureOut">
               <a:rPr lang="en-AU" smtClean="0"/>
-              <a:t>18/03/2013</a:t>
+              <a:t>20/03/2013</a:t>
             </a:fld>
             <a:endParaRPr lang="en-AU"/>
           </a:p>
@@ -1774,7 +1776,7 @@
           <a:p>
             <a:fld id="{9674196C-5CA3-4053-8720-8066237EE849}" type="datetimeFigureOut">
               <a:rPr lang="en-AU" smtClean="0"/>
-              <a:t>18/03/2013</a:t>
+              <a:t>20/03/2013</a:t>
             </a:fld>
             <a:endParaRPr lang="en-AU"/>
           </a:p>
@@ -1892,7 +1894,7 @@
           <a:p>
             <a:fld id="{9674196C-5CA3-4053-8720-8066237EE849}" type="datetimeFigureOut">
               <a:rPr lang="en-AU" smtClean="0"/>
-              <a:t>18/03/2013</a:t>
+              <a:t>20/03/2013</a:t>
             </a:fld>
             <a:endParaRPr lang="en-AU"/>
           </a:p>
@@ -1987,7 +1989,7 @@
           <a:p>
             <a:fld id="{9674196C-5CA3-4053-8720-8066237EE849}" type="datetimeFigureOut">
               <a:rPr lang="en-AU" smtClean="0"/>
-              <a:t>18/03/2013</a:t>
+              <a:t>20/03/2013</a:t>
             </a:fld>
             <a:endParaRPr lang="en-AU"/>
           </a:p>
@@ -2264,7 +2266,7 @@
           <a:p>
             <a:fld id="{9674196C-5CA3-4053-8720-8066237EE849}" type="datetimeFigureOut">
               <a:rPr lang="en-AU" smtClean="0"/>
-              <a:t>18/03/2013</a:t>
+              <a:t>20/03/2013</a:t>
             </a:fld>
             <a:endParaRPr lang="en-AU"/>
           </a:p>
@@ -2517,7 +2519,7 @@
           <a:p>
             <a:fld id="{9674196C-5CA3-4053-8720-8066237EE849}" type="datetimeFigureOut">
               <a:rPr lang="en-AU" smtClean="0"/>
-              <a:t>18/03/2013</a:t>
+              <a:t>20/03/2013</a:t>
             </a:fld>
             <a:endParaRPr lang="en-AU"/>
           </a:p>
@@ -2730,7 +2732,7 @@
           <a:p>
             <a:fld id="{9674196C-5CA3-4053-8720-8066237EE849}" type="datetimeFigureOut">
               <a:rPr lang="en-AU" smtClean="0"/>
-              <a:t>18/03/2013</a:t>
+              <a:t>20/03/2013</a:t>
             </a:fld>
             <a:endParaRPr lang="en-AU"/>
           </a:p>
@@ -3255,11 +3257,7 @@
           <a:p>
             <a:r>
               <a:rPr lang="en-AU" dirty="0" smtClean="0"/>
-              <a:t>partition = </a:t>
-            </a:r>
-            <a:r>
-              <a:rPr lang="en-AU" dirty="0" smtClean="0"/>
-              <a:t>new </a:t>
+              <a:t>partition = new </a:t>
             </a:r>
             <a:r>
               <a:rPr lang="en-AU" dirty="0" err="1" smtClean="0"/>
@@ -3321,11 +3319,7 @@
           <a:p>
             <a:r>
               <a:rPr lang="en-AU" dirty="0" smtClean="0"/>
-              <a:t>      partition = </a:t>
-            </a:r>
-            <a:r>
-              <a:rPr lang="en-AU" dirty="0" smtClean="0"/>
-              <a:t>new </a:t>
+              <a:t>      partition = new </a:t>
             </a:r>
             <a:r>
               <a:rPr lang="en-AU" dirty="0" err="1" smtClean="0"/>
@@ -3678,6 +3672,1893 @@
 </file>
 
 <file path=ppt/slides/slide11.xml><?xml version="1.0" encoding="utf-8"?>
+<p:sld xmlns:a="http://schemas.openxmlformats.org/drawingml/2006/main" xmlns:r="http://schemas.openxmlformats.org/officeDocument/2006/relationships" xmlns:p="http://schemas.openxmlformats.org/presentationml/2006/main">
+  <p:cSld>
+    <p:spTree>
+      <p:nvGrpSpPr>
+        <p:cNvPr id="1" name=""/>
+        <p:cNvGrpSpPr/>
+        <p:nvPr/>
+      </p:nvGrpSpPr>
+      <p:grpSpPr>
+        <a:xfrm>
+          <a:off x="0" y="0"/>
+          <a:ext cx="0" cy="0"/>
+          <a:chOff x="0" y="0"/>
+          <a:chExt cx="0" cy="0"/>
+        </a:xfrm>
+      </p:grpSpPr>
+      <p:sp>
+        <p:nvSpPr>
+          <p:cNvPr id="2" name="Title 1"/>
+          <p:cNvSpPr>
+            <a:spLocks noGrp="1"/>
+          </p:cNvSpPr>
+          <p:nvPr>
+            <p:ph type="title"/>
+          </p:nvPr>
+        </p:nvSpPr>
+        <p:spPr/>
+        <p:txBody>
+          <a:bodyPr/>
+          <a:lstStyle/>
+          <a:p>
+            <a:r>
+              <a:rPr lang="en-AU" dirty="0" smtClean="0"/>
+              <a:t>Cycle Detection</a:t>
+            </a:r>
+            <a:endParaRPr lang="en-AU" dirty="0"/>
+          </a:p>
+        </p:txBody>
+      </p:sp>
+      <p:sp>
+        <p:nvSpPr>
+          <p:cNvPr id="3" name="Content Placeholder 2"/>
+          <p:cNvSpPr>
+            <a:spLocks noGrp="1"/>
+          </p:cNvSpPr>
+          <p:nvPr>
+            <p:ph idx="1"/>
+          </p:nvPr>
+        </p:nvSpPr>
+        <p:spPr/>
+        <p:txBody>
+          <a:bodyPr>
+            <a:normAutofit fontScale="92500" lnSpcReduction="20000"/>
+          </a:bodyPr>
+          <a:lstStyle/>
+          <a:p>
+            <a:pPr marL="0" indent="0">
+              <a:buNone/>
+            </a:pPr>
+            <a:r>
+              <a:rPr lang="en-AU" dirty="0" err="1" smtClean="0"/>
+              <a:t>CutCycles</a:t>
+            </a:r>
+            <a:r>
+              <a:rPr lang="en-AU" dirty="0" smtClean="0"/>
+              <a:t>(Node* parent, Signal sig)</a:t>
+            </a:r>
+          </a:p>
+          <a:p>
+            <a:pPr marL="0" indent="0">
+              <a:buNone/>
+            </a:pPr>
+            <a:r>
+              <a:rPr lang="en-AU" dirty="0"/>
+              <a:t> </a:t>
+            </a:r>
+            <a:r>
+              <a:rPr lang="en-AU" dirty="0" smtClean="0"/>
+              <a:t>   node = sig-&gt;source</a:t>
+            </a:r>
+          </a:p>
+          <a:p>
+            <a:pPr marL="0" indent="0">
+              <a:buNone/>
+            </a:pPr>
+            <a:r>
+              <a:rPr lang="en-AU" dirty="0"/>
+              <a:t> </a:t>
+            </a:r>
+            <a:r>
+              <a:rPr lang="en-AU" dirty="0" smtClean="0"/>
+              <a:t>   if(exploring[node] == true)</a:t>
+            </a:r>
+          </a:p>
+          <a:p>
+            <a:pPr marL="0" indent="0">
+              <a:buNone/>
+            </a:pPr>
+            <a:r>
+              <a:rPr lang="en-AU" dirty="0"/>
+              <a:t> </a:t>
+            </a:r>
+            <a:r>
+              <a:rPr lang="en-AU" dirty="0" smtClean="0"/>
+              <a:t>       </a:t>
+            </a:r>
+            <a:r>
+              <a:rPr lang="en-AU" dirty="0" err="1" smtClean="0"/>
+              <a:t>CutLoop</a:t>
+            </a:r>
+            <a:endParaRPr lang="en-AU" dirty="0" smtClean="0"/>
+          </a:p>
+          <a:p>
+            <a:pPr marL="0" indent="0">
+              <a:buNone/>
+            </a:pPr>
+            <a:r>
+              <a:rPr lang="en-AU" dirty="0"/>
+              <a:t> </a:t>
+            </a:r>
+            <a:r>
+              <a:rPr lang="en-AU" dirty="0" smtClean="0"/>
+              <a:t>   else</a:t>
+            </a:r>
+          </a:p>
+          <a:p>
+            <a:pPr marL="0" indent="0">
+              <a:buNone/>
+            </a:pPr>
+            <a:r>
+              <a:rPr lang="en-AU" dirty="0"/>
+              <a:t> </a:t>
+            </a:r>
+            <a:r>
+              <a:rPr lang="en-AU" dirty="0" smtClean="0"/>
+              <a:t>       exploring[node] = true</a:t>
+            </a:r>
+          </a:p>
+          <a:p>
+            <a:pPr marL="0" indent="0">
+              <a:buNone/>
+            </a:pPr>
+            <a:r>
+              <a:rPr lang="en-AU" dirty="0"/>
+              <a:t> </a:t>
+            </a:r>
+            <a:r>
+              <a:rPr lang="en-AU" dirty="0" smtClean="0"/>
+              <a:t>       FOREACH(signal in node-&gt;inputs)</a:t>
+            </a:r>
+          </a:p>
+          <a:p>
+            <a:pPr marL="0" indent="0">
+              <a:buNone/>
+            </a:pPr>
+            <a:r>
+              <a:rPr lang="en-AU" dirty="0"/>
+              <a:t> </a:t>
+            </a:r>
+            <a:r>
+              <a:rPr lang="en-AU" dirty="0" smtClean="0"/>
+              <a:t>           </a:t>
+            </a:r>
+            <a:r>
+              <a:rPr lang="en-AU" dirty="0" err="1" smtClean="0"/>
+              <a:t>CutCycles</a:t>
+            </a:r>
+            <a:r>
+              <a:rPr lang="en-AU" dirty="0" smtClean="0"/>
+              <a:t>(node, signal)</a:t>
+            </a:r>
+          </a:p>
+          <a:p>
+            <a:pPr marL="0" indent="0">
+              <a:buNone/>
+            </a:pPr>
+            <a:r>
+              <a:rPr lang="en-AU" dirty="0"/>
+              <a:t> </a:t>
+            </a:r>
+            <a:r>
+              <a:rPr lang="en-AU" dirty="0" smtClean="0"/>
+              <a:t>        exploring[node] = false</a:t>
+            </a:r>
+            <a:endParaRPr lang="en-AU" dirty="0"/>
+          </a:p>
+        </p:txBody>
+      </p:sp>
+    </p:spTree>
+    <p:extLst>
+      <p:ext uri="{BB962C8B-B14F-4D97-AF65-F5344CB8AC3E}">
+        <p14:creationId xmlns:p14="http://schemas.microsoft.com/office/powerpoint/2010/main" val="903370508"/>
+      </p:ext>
+    </p:extLst>
+  </p:cSld>
+  <p:clrMapOvr>
+    <a:masterClrMapping/>
+  </p:clrMapOvr>
+</p:sld>
+</file>
+
+<file path=ppt/slides/slide12.xml><?xml version="1.0" encoding="utf-8"?>
+<p:sld xmlns:a="http://schemas.openxmlformats.org/drawingml/2006/main" xmlns:r="http://schemas.openxmlformats.org/officeDocument/2006/relationships" xmlns:p="http://schemas.openxmlformats.org/presentationml/2006/main">
+  <p:cSld>
+    <p:spTree>
+      <p:nvGrpSpPr>
+        <p:cNvPr id="1" name=""/>
+        <p:cNvGrpSpPr/>
+        <p:nvPr/>
+      </p:nvGrpSpPr>
+      <p:grpSpPr>
+        <a:xfrm>
+          <a:off x="0" y="0"/>
+          <a:ext cx="0" cy="0"/>
+          <a:chOff x="0" y="0"/>
+          <a:chExt cx="0" cy="0"/>
+        </a:xfrm>
+      </p:grpSpPr>
+      <p:sp>
+        <p:nvSpPr>
+          <p:cNvPr id="2" name="Title 1"/>
+          <p:cNvSpPr>
+            <a:spLocks noGrp="1"/>
+          </p:cNvSpPr>
+          <p:nvPr>
+            <p:ph type="title"/>
+          </p:nvPr>
+        </p:nvSpPr>
+        <p:spPr/>
+        <p:txBody>
+          <a:bodyPr/>
+          <a:lstStyle/>
+          <a:p>
+            <a:endParaRPr lang="en-AU"/>
+          </a:p>
+        </p:txBody>
+      </p:sp>
+      <p:sp>
+        <p:nvSpPr>
+          <p:cNvPr id="3" name="Content Placeholder 2"/>
+          <p:cNvSpPr>
+            <a:spLocks noGrp="1"/>
+          </p:cNvSpPr>
+          <p:nvPr>
+            <p:ph idx="1"/>
+          </p:nvPr>
+        </p:nvSpPr>
+        <p:spPr/>
+        <p:txBody>
+          <a:bodyPr/>
+          <a:lstStyle/>
+          <a:p>
+            <a:r>
+              <a:rPr lang="en-AU" dirty="0" smtClean="0"/>
+              <a:t>White is unvisited, grey is exploring, black is finished</a:t>
+            </a:r>
+            <a:endParaRPr lang="en-AU" dirty="0"/>
+          </a:p>
+        </p:txBody>
+      </p:sp>
+      <p:sp>
+        <p:nvSpPr>
+          <p:cNvPr id="4" name="Oval 3"/>
+          <p:cNvSpPr/>
+          <p:nvPr/>
+        </p:nvSpPr>
+        <p:spPr>
+          <a:xfrm>
+            <a:off x="611560" y="3859407"/>
+            <a:ext cx="648072" cy="648072"/>
+          </a:xfrm>
+          <a:prstGeom prst="ellipse">
+            <a:avLst/>
+          </a:prstGeom>
+          <a:solidFill>
+            <a:schemeClr val="bg1"/>
+          </a:solidFill>
+        </p:spPr>
+        <p:style>
+          <a:lnRef idx="2">
+            <a:schemeClr val="accent1">
+              <a:shade val="50000"/>
+            </a:schemeClr>
+          </a:lnRef>
+          <a:fillRef idx="1">
+            <a:schemeClr val="accent1"/>
+          </a:fillRef>
+          <a:effectRef idx="0">
+            <a:schemeClr val="accent1"/>
+          </a:effectRef>
+          <a:fontRef idx="minor">
+            <a:schemeClr val="lt1"/>
+          </a:fontRef>
+        </p:style>
+        <p:txBody>
+          <a:bodyPr rtlCol="0" anchor="ctr"/>
+          <a:lstStyle/>
+          <a:p>
+            <a:pPr algn="ctr"/>
+            <a:endParaRPr lang="en-AU"/>
+          </a:p>
+        </p:txBody>
+      </p:sp>
+      <p:sp>
+        <p:nvSpPr>
+          <p:cNvPr id="5" name="Oval 4"/>
+          <p:cNvSpPr/>
+          <p:nvPr/>
+        </p:nvSpPr>
+        <p:spPr>
+          <a:xfrm>
+            <a:off x="611560" y="4795511"/>
+            <a:ext cx="648072" cy="648072"/>
+          </a:xfrm>
+          <a:prstGeom prst="ellipse">
+            <a:avLst/>
+          </a:prstGeom>
+          <a:solidFill>
+            <a:schemeClr val="bg1"/>
+          </a:solidFill>
+        </p:spPr>
+        <p:style>
+          <a:lnRef idx="2">
+            <a:schemeClr val="accent1">
+              <a:shade val="50000"/>
+            </a:schemeClr>
+          </a:lnRef>
+          <a:fillRef idx="1">
+            <a:schemeClr val="accent1"/>
+          </a:fillRef>
+          <a:effectRef idx="0">
+            <a:schemeClr val="accent1"/>
+          </a:effectRef>
+          <a:fontRef idx="minor">
+            <a:schemeClr val="lt1"/>
+          </a:fontRef>
+        </p:style>
+        <p:txBody>
+          <a:bodyPr rtlCol="0" anchor="ctr"/>
+          <a:lstStyle/>
+          <a:p>
+            <a:pPr algn="ctr"/>
+            <a:endParaRPr lang="en-AU"/>
+          </a:p>
+        </p:txBody>
+      </p:sp>
+      <p:sp>
+        <p:nvSpPr>
+          <p:cNvPr id="6" name="Oval 5"/>
+          <p:cNvSpPr/>
+          <p:nvPr/>
+        </p:nvSpPr>
+        <p:spPr>
+          <a:xfrm>
+            <a:off x="611560" y="5693970"/>
+            <a:ext cx="648072" cy="648072"/>
+          </a:xfrm>
+          <a:prstGeom prst="ellipse">
+            <a:avLst/>
+          </a:prstGeom>
+          <a:solidFill>
+            <a:schemeClr val="bg1"/>
+          </a:solidFill>
+        </p:spPr>
+        <p:style>
+          <a:lnRef idx="2">
+            <a:schemeClr val="accent1">
+              <a:shade val="50000"/>
+            </a:schemeClr>
+          </a:lnRef>
+          <a:fillRef idx="1">
+            <a:schemeClr val="accent1"/>
+          </a:fillRef>
+          <a:effectRef idx="0">
+            <a:schemeClr val="accent1"/>
+          </a:effectRef>
+          <a:fontRef idx="minor">
+            <a:schemeClr val="lt1"/>
+          </a:fontRef>
+        </p:style>
+        <p:txBody>
+          <a:bodyPr rtlCol="0" anchor="ctr"/>
+          <a:lstStyle/>
+          <a:p>
+            <a:pPr algn="ctr"/>
+            <a:endParaRPr lang="en-AU"/>
+          </a:p>
+        </p:txBody>
+      </p:sp>
+      <p:sp>
+        <p:nvSpPr>
+          <p:cNvPr id="8" name="Oval 7"/>
+          <p:cNvSpPr/>
+          <p:nvPr/>
+        </p:nvSpPr>
+        <p:spPr>
+          <a:xfrm>
+            <a:off x="1763688" y="4795511"/>
+            <a:ext cx="648072" cy="648072"/>
+          </a:xfrm>
+          <a:prstGeom prst="ellipse">
+            <a:avLst/>
+          </a:prstGeom>
+          <a:solidFill>
+            <a:schemeClr val="bg1"/>
+          </a:solidFill>
+        </p:spPr>
+        <p:style>
+          <a:lnRef idx="2">
+            <a:schemeClr val="accent1">
+              <a:shade val="50000"/>
+            </a:schemeClr>
+          </a:lnRef>
+          <a:fillRef idx="1">
+            <a:schemeClr val="accent1"/>
+          </a:fillRef>
+          <a:effectRef idx="0">
+            <a:schemeClr val="accent1"/>
+          </a:effectRef>
+          <a:fontRef idx="minor">
+            <a:schemeClr val="lt1"/>
+          </a:fontRef>
+        </p:style>
+        <p:txBody>
+          <a:bodyPr rtlCol="0" anchor="ctr"/>
+          <a:lstStyle/>
+          <a:p>
+            <a:pPr algn="ctr"/>
+            <a:endParaRPr lang="en-AU"/>
+          </a:p>
+        </p:txBody>
+      </p:sp>
+      <p:sp>
+        <p:nvSpPr>
+          <p:cNvPr id="10" name="Oval 9"/>
+          <p:cNvSpPr/>
+          <p:nvPr/>
+        </p:nvSpPr>
+        <p:spPr>
+          <a:xfrm>
+            <a:off x="1763688" y="5693970"/>
+            <a:ext cx="648072" cy="648072"/>
+          </a:xfrm>
+          <a:prstGeom prst="ellipse">
+            <a:avLst/>
+          </a:prstGeom>
+          <a:solidFill>
+            <a:schemeClr val="bg1"/>
+          </a:solidFill>
+        </p:spPr>
+        <p:style>
+          <a:lnRef idx="2">
+            <a:schemeClr val="accent1">
+              <a:shade val="50000"/>
+            </a:schemeClr>
+          </a:lnRef>
+          <a:fillRef idx="1">
+            <a:schemeClr val="accent1"/>
+          </a:fillRef>
+          <a:effectRef idx="0">
+            <a:schemeClr val="accent1"/>
+          </a:effectRef>
+          <a:fontRef idx="minor">
+            <a:schemeClr val="lt1"/>
+          </a:fontRef>
+        </p:style>
+        <p:txBody>
+          <a:bodyPr rtlCol="0" anchor="ctr"/>
+          <a:lstStyle/>
+          <a:p>
+            <a:pPr algn="ctr"/>
+            <a:endParaRPr lang="en-AU"/>
+          </a:p>
+        </p:txBody>
+      </p:sp>
+      <p:cxnSp>
+        <p:nvCxnSpPr>
+          <p:cNvPr id="12" name="Straight Arrow Connector 11"/>
+          <p:cNvCxnSpPr/>
+          <p:nvPr/>
+        </p:nvCxnSpPr>
+        <p:spPr>
+          <a:xfrm>
+            <a:off x="935596" y="4507479"/>
+            <a:ext cx="0" cy="288032"/>
+          </a:xfrm>
+          <a:prstGeom prst="straightConnector1">
+            <a:avLst/>
+          </a:prstGeom>
+          <a:ln>
+            <a:tailEnd type="arrow"/>
+          </a:ln>
+        </p:spPr>
+        <p:style>
+          <a:lnRef idx="1">
+            <a:schemeClr val="accent1"/>
+          </a:lnRef>
+          <a:fillRef idx="0">
+            <a:schemeClr val="accent1"/>
+          </a:fillRef>
+          <a:effectRef idx="0">
+            <a:schemeClr val="accent1"/>
+          </a:effectRef>
+          <a:fontRef idx="minor">
+            <a:schemeClr val="tx1"/>
+          </a:fontRef>
+        </p:style>
+      </p:cxnSp>
+      <p:cxnSp>
+        <p:nvCxnSpPr>
+          <p:cNvPr id="13" name="Straight Arrow Connector 12"/>
+          <p:cNvCxnSpPr/>
+          <p:nvPr/>
+        </p:nvCxnSpPr>
+        <p:spPr>
+          <a:xfrm>
+            <a:off x="935596" y="5443583"/>
+            <a:ext cx="0" cy="288032"/>
+          </a:xfrm>
+          <a:prstGeom prst="straightConnector1">
+            <a:avLst/>
+          </a:prstGeom>
+          <a:ln>
+            <a:tailEnd type="arrow"/>
+          </a:ln>
+        </p:spPr>
+        <p:style>
+          <a:lnRef idx="1">
+            <a:schemeClr val="accent1"/>
+          </a:lnRef>
+          <a:fillRef idx="0">
+            <a:schemeClr val="accent1"/>
+          </a:fillRef>
+          <a:effectRef idx="0">
+            <a:schemeClr val="accent1"/>
+          </a:effectRef>
+          <a:fontRef idx="minor">
+            <a:schemeClr val="tx1"/>
+          </a:fontRef>
+        </p:style>
+      </p:cxnSp>
+      <p:cxnSp>
+        <p:nvCxnSpPr>
+          <p:cNvPr id="17" name="Straight Arrow Connector 16"/>
+          <p:cNvCxnSpPr>
+            <a:stCxn id="6" idx="6"/>
+            <a:endCxn id="10" idx="2"/>
+          </p:cNvCxnSpPr>
+          <p:nvPr/>
+        </p:nvCxnSpPr>
+        <p:spPr>
+          <a:xfrm>
+            <a:off x="1259632" y="6018006"/>
+            <a:ext cx="504056" cy="0"/>
+          </a:xfrm>
+          <a:prstGeom prst="straightConnector1">
+            <a:avLst/>
+          </a:prstGeom>
+          <a:ln>
+            <a:tailEnd type="arrow"/>
+          </a:ln>
+        </p:spPr>
+        <p:style>
+          <a:lnRef idx="1">
+            <a:schemeClr val="accent1"/>
+          </a:lnRef>
+          <a:fillRef idx="0">
+            <a:schemeClr val="accent1"/>
+          </a:fillRef>
+          <a:effectRef idx="0">
+            <a:schemeClr val="accent1"/>
+          </a:effectRef>
+          <a:fontRef idx="minor">
+            <a:schemeClr val="tx1"/>
+          </a:fontRef>
+        </p:style>
+      </p:cxnSp>
+      <p:cxnSp>
+        <p:nvCxnSpPr>
+          <p:cNvPr id="19" name="Straight Arrow Connector 18"/>
+          <p:cNvCxnSpPr>
+            <a:stCxn id="10" idx="0"/>
+          </p:cNvCxnSpPr>
+          <p:nvPr/>
+        </p:nvCxnSpPr>
+        <p:spPr>
+          <a:xfrm flipV="1">
+            <a:off x="2087724" y="5443583"/>
+            <a:ext cx="0" cy="250387"/>
+          </a:xfrm>
+          <a:prstGeom prst="straightConnector1">
+            <a:avLst/>
+          </a:prstGeom>
+          <a:ln>
+            <a:tailEnd type="arrow"/>
+          </a:ln>
+        </p:spPr>
+        <p:style>
+          <a:lnRef idx="1">
+            <a:schemeClr val="accent1"/>
+          </a:lnRef>
+          <a:fillRef idx="0">
+            <a:schemeClr val="accent1"/>
+          </a:fillRef>
+          <a:effectRef idx="0">
+            <a:schemeClr val="accent1"/>
+          </a:effectRef>
+          <a:fontRef idx="minor">
+            <a:schemeClr val="tx1"/>
+          </a:fontRef>
+        </p:style>
+      </p:cxnSp>
+      <p:cxnSp>
+        <p:nvCxnSpPr>
+          <p:cNvPr id="21" name="Straight Arrow Connector 20"/>
+          <p:cNvCxnSpPr>
+            <a:endCxn id="5" idx="6"/>
+          </p:cNvCxnSpPr>
+          <p:nvPr/>
+        </p:nvCxnSpPr>
+        <p:spPr>
+          <a:xfrm flipH="1">
+            <a:off x="1259632" y="5119547"/>
+            <a:ext cx="504056" cy="0"/>
+          </a:xfrm>
+          <a:prstGeom prst="straightConnector1">
+            <a:avLst/>
+          </a:prstGeom>
+          <a:ln>
+            <a:tailEnd type="arrow"/>
+          </a:ln>
+        </p:spPr>
+        <p:style>
+          <a:lnRef idx="1">
+            <a:schemeClr val="accent1"/>
+          </a:lnRef>
+          <a:fillRef idx="0">
+            <a:schemeClr val="accent1"/>
+          </a:fillRef>
+          <a:effectRef idx="0">
+            <a:schemeClr val="accent1"/>
+          </a:effectRef>
+          <a:fontRef idx="minor">
+            <a:schemeClr val="tx1"/>
+          </a:fontRef>
+        </p:style>
+      </p:cxnSp>
+      <p:sp>
+        <p:nvSpPr>
+          <p:cNvPr id="22" name="Oval 21"/>
+          <p:cNvSpPr/>
+          <p:nvPr/>
+        </p:nvSpPr>
+        <p:spPr>
+          <a:xfrm>
+            <a:off x="2699792" y="3859407"/>
+            <a:ext cx="648072" cy="648072"/>
+          </a:xfrm>
+          <a:prstGeom prst="ellipse">
+            <a:avLst/>
+          </a:prstGeom>
+          <a:solidFill>
+            <a:schemeClr val="bg2"/>
+          </a:solidFill>
+        </p:spPr>
+        <p:style>
+          <a:lnRef idx="2">
+            <a:schemeClr val="accent1">
+              <a:shade val="50000"/>
+            </a:schemeClr>
+          </a:lnRef>
+          <a:fillRef idx="1">
+            <a:schemeClr val="accent1"/>
+          </a:fillRef>
+          <a:effectRef idx="0">
+            <a:schemeClr val="accent1"/>
+          </a:effectRef>
+          <a:fontRef idx="minor">
+            <a:schemeClr val="lt1"/>
+          </a:fontRef>
+        </p:style>
+        <p:txBody>
+          <a:bodyPr rtlCol="0" anchor="ctr"/>
+          <a:lstStyle/>
+          <a:p>
+            <a:pPr algn="ctr"/>
+            <a:endParaRPr lang="en-AU"/>
+          </a:p>
+        </p:txBody>
+      </p:sp>
+      <p:sp>
+        <p:nvSpPr>
+          <p:cNvPr id="23" name="Oval 22"/>
+          <p:cNvSpPr/>
+          <p:nvPr/>
+        </p:nvSpPr>
+        <p:spPr>
+          <a:xfrm>
+            <a:off x="2699792" y="4795511"/>
+            <a:ext cx="648072" cy="648072"/>
+          </a:xfrm>
+          <a:prstGeom prst="ellipse">
+            <a:avLst/>
+          </a:prstGeom>
+          <a:solidFill>
+            <a:schemeClr val="bg2"/>
+          </a:solidFill>
+        </p:spPr>
+        <p:style>
+          <a:lnRef idx="2">
+            <a:schemeClr val="accent1">
+              <a:shade val="50000"/>
+            </a:schemeClr>
+          </a:lnRef>
+          <a:fillRef idx="1">
+            <a:schemeClr val="accent1"/>
+          </a:fillRef>
+          <a:effectRef idx="0">
+            <a:schemeClr val="accent1"/>
+          </a:effectRef>
+          <a:fontRef idx="minor">
+            <a:schemeClr val="lt1"/>
+          </a:fontRef>
+        </p:style>
+        <p:txBody>
+          <a:bodyPr rtlCol="0" anchor="ctr"/>
+          <a:lstStyle/>
+          <a:p>
+            <a:pPr algn="ctr"/>
+            <a:endParaRPr lang="en-AU"/>
+          </a:p>
+        </p:txBody>
+      </p:sp>
+      <p:sp>
+        <p:nvSpPr>
+          <p:cNvPr id="24" name="Oval 23"/>
+          <p:cNvSpPr/>
+          <p:nvPr/>
+        </p:nvSpPr>
+        <p:spPr>
+          <a:xfrm>
+            <a:off x="2699792" y="5693970"/>
+            <a:ext cx="648072" cy="648072"/>
+          </a:xfrm>
+          <a:prstGeom prst="ellipse">
+            <a:avLst/>
+          </a:prstGeom>
+          <a:solidFill>
+            <a:schemeClr val="bg2"/>
+          </a:solidFill>
+        </p:spPr>
+        <p:style>
+          <a:lnRef idx="2">
+            <a:schemeClr val="accent1">
+              <a:shade val="50000"/>
+            </a:schemeClr>
+          </a:lnRef>
+          <a:fillRef idx="1">
+            <a:schemeClr val="accent1"/>
+          </a:fillRef>
+          <a:effectRef idx="0">
+            <a:schemeClr val="accent1"/>
+          </a:effectRef>
+          <a:fontRef idx="minor">
+            <a:schemeClr val="lt1"/>
+          </a:fontRef>
+        </p:style>
+        <p:txBody>
+          <a:bodyPr rtlCol="0" anchor="ctr"/>
+          <a:lstStyle/>
+          <a:p>
+            <a:pPr algn="ctr"/>
+            <a:endParaRPr lang="en-AU"/>
+          </a:p>
+        </p:txBody>
+      </p:sp>
+      <p:sp>
+        <p:nvSpPr>
+          <p:cNvPr id="25" name="Oval 24"/>
+          <p:cNvSpPr/>
+          <p:nvPr/>
+        </p:nvSpPr>
+        <p:spPr>
+          <a:xfrm>
+            <a:off x="3851920" y="4795511"/>
+            <a:ext cx="648072" cy="648072"/>
+          </a:xfrm>
+          <a:prstGeom prst="ellipse">
+            <a:avLst/>
+          </a:prstGeom>
+          <a:solidFill>
+            <a:schemeClr val="bg1"/>
+          </a:solidFill>
+        </p:spPr>
+        <p:style>
+          <a:lnRef idx="2">
+            <a:schemeClr val="accent1">
+              <a:shade val="50000"/>
+            </a:schemeClr>
+          </a:lnRef>
+          <a:fillRef idx="1">
+            <a:schemeClr val="accent1"/>
+          </a:fillRef>
+          <a:effectRef idx="0">
+            <a:schemeClr val="accent1"/>
+          </a:effectRef>
+          <a:fontRef idx="minor">
+            <a:schemeClr val="lt1"/>
+          </a:fontRef>
+        </p:style>
+        <p:txBody>
+          <a:bodyPr rtlCol="0" anchor="ctr"/>
+          <a:lstStyle/>
+          <a:p>
+            <a:pPr algn="ctr"/>
+            <a:endParaRPr lang="en-AU"/>
+          </a:p>
+        </p:txBody>
+      </p:sp>
+      <p:sp>
+        <p:nvSpPr>
+          <p:cNvPr id="26" name="Oval 25"/>
+          <p:cNvSpPr/>
+          <p:nvPr/>
+        </p:nvSpPr>
+        <p:spPr>
+          <a:xfrm>
+            <a:off x="3851920" y="5693970"/>
+            <a:ext cx="648072" cy="648072"/>
+          </a:xfrm>
+          <a:prstGeom prst="ellipse">
+            <a:avLst/>
+          </a:prstGeom>
+          <a:solidFill>
+            <a:schemeClr val="bg1"/>
+          </a:solidFill>
+        </p:spPr>
+        <p:style>
+          <a:lnRef idx="2">
+            <a:schemeClr val="accent1">
+              <a:shade val="50000"/>
+            </a:schemeClr>
+          </a:lnRef>
+          <a:fillRef idx="1">
+            <a:schemeClr val="accent1"/>
+          </a:fillRef>
+          <a:effectRef idx="0">
+            <a:schemeClr val="accent1"/>
+          </a:effectRef>
+          <a:fontRef idx="minor">
+            <a:schemeClr val="lt1"/>
+          </a:fontRef>
+        </p:style>
+        <p:txBody>
+          <a:bodyPr rtlCol="0" anchor="ctr"/>
+          <a:lstStyle/>
+          <a:p>
+            <a:pPr algn="ctr"/>
+            <a:endParaRPr lang="en-AU"/>
+          </a:p>
+        </p:txBody>
+      </p:sp>
+      <p:cxnSp>
+        <p:nvCxnSpPr>
+          <p:cNvPr id="27" name="Straight Arrow Connector 26"/>
+          <p:cNvCxnSpPr/>
+          <p:nvPr/>
+        </p:nvCxnSpPr>
+        <p:spPr>
+          <a:xfrm>
+            <a:off x="3023828" y="4507479"/>
+            <a:ext cx="0" cy="288032"/>
+          </a:xfrm>
+          <a:prstGeom prst="straightConnector1">
+            <a:avLst/>
+          </a:prstGeom>
+          <a:ln>
+            <a:tailEnd type="arrow"/>
+          </a:ln>
+        </p:spPr>
+        <p:style>
+          <a:lnRef idx="1">
+            <a:schemeClr val="accent1"/>
+          </a:lnRef>
+          <a:fillRef idx="0">
+            <a:schemeClr val="accent1"/>
+          </a:fillRef>
+          <a:effectRef idx="0">
+            <a:schemeClr val="accent1"/>
+          </a:effectRef>
+          <a:fontRef idx="minor">
+            <a:schemeClr val="tx1"/>
+          </a:fontRef>
+        </p:style>
+      </p:cxnSp>
+      <p:cxnSp>
+        <p:nvCxnSpPr>
+          <p:cNvPr id="28" name="Straight Arrow Connector 27"/>
+          <p:cNvCxnSpPr/>
+          <p:nvPr/>
+        </p:nvCxnSpPr>
+        <p:spPr>
+          <a:xfrm>
+            <a:off x="3023828" y="5443583"/>
+            <a:ext cx="0" cy="288032"/>
+          </a:xfrm>
+          <a:prstGeom prst="straightConnector1">
+            <a:avLst/>
+          </a:prstGeom>
+          <a:ln>
+            <a:tailEnd type="arrow"/>
+          </a:ln>
+        </p:spPr>
+        <p:style>
+          <a:lnRef idx="1">
+            <a:schemeClr val="accent1"/>
+          </a:lnRef>
+          <a:fillRef idx="0">
+            <a:schemeClr val="accent1"/>
+          </a:fillRef>
+          <a:effectRef idx="0">
+            <a:schemeClr val="accent1"/>
+          </a:effectRef>
+          <a:fontRef idx="minor">
+            <a:schemeClr val="tx1"/>
+          </a:fontRef>
+        </p:style>
+      </p:cxnSp>
+      <p:cxnSp>
+        <p:nvCxnSpPr>
+          <p:cNvPr id="29" name="Straight Arrow Connector 28"/>
+          <p:cNvCxnSpPr>
+            <a:stCxn id="24" idx="6"/>
+            <a:endCxn id="26" idx="2"/>
+          </p:cNvCxnSpPr>
+          <p:nvPr/>
+        </p:nvCxnSpPr>
+        <p:spPr>
+          <a:xfrm>
+            <a:off x="3347864" y="6018006"/>
+            <a:ext cx="504056" cy="0"/>
+          </a:xfrm>
+          <a:prstGeom prst="straightConnector1">
+            <a:avLst/>
+          </a:prstGeom>
+          <a:ln>
+            <a:tailEnd type="arrow"/>
+          </a:ln>
+        </p:spPr>
+        <p:style>
+          <a:lnRef idx="1">
+            <a:schemeClr val="accent1"/>
+          </a:lnRef>
+          <a:fillRef idx="0">
+            <a:schemeClr val="accent1"/>
+          </a:fillRef>
+          <a:effectRef idx="0">
+            <a:schemeClr val="accent1"/>
+          </a:effectRef>
+          <a:fontRef idx="minor">
+            <a:schemeClr val="tx1"/>
+          </a:fontRef>
+        </p:style>
+      </p:cxnSp>
+      <p:cxnSp>
+        <p:nvCxnSpPr>
+          <p:cNvPr id="30" name="Straight Arrow Connector 29"/>
+          <p:cNvCxnSpPr>
+            <a:stCxn id="26" idx="0"/>
+          </p:cNvCxnSpPr>
+          <p:nvPr/>
+        </p:nvCxnSpPr>
+        <p:spPr>
+          <a:xfrm flipV="1">
+            <a:off x="4175956" y="5443583"/>
+            <a:ext cx="0" cy="250387"/>
+          </a:xfrm>
+          <a:prstGeom prst="straightConnector1">
+            <a:avLst/>
+          </a:prstGeom>
+          <a:ln>
+            <a:tailEnd type="arrow"/>
+          </a:ln>
+        </p:spPr>
+        <p:style>
+          <a:lnRef idx="1">
+            <a:schemeClr val="accent1"/>
+          </a:lnRef>
+          <a:fillRef idx="0">
+            <a:schemeClr val="accent1"/>
+          </a:fillRef>
+          <a:effectRef idx="0">
+            <a:schemeClr val="accent1"/>
+          </a:effectRef>
+          <a:fontRef idx="minor">
+            <a:schemeClr val="tx1"/>
+          </a:fontRef>
+        </p:style>
+      </p:cxnSp>
+      <p:cxnSp>
+        <p:nvCxnSpPr>
+          <p:cNvPr id="31" name="Straight Arrow Connector 30"/>
+          <p:cNvCxnSpPr>
+            <a:endCxn id="23" idx="6"/>
+          </p:cNvCxnSpPr>
+          <p:nvPr/>
+        </p:nvCxnSpPr>
+        <p:spPr>
+          <a:xfrm flipH="1">
+            <a:off x="3347864" y="5119547"/>
+            <a:ext cx="504056" cy="0"/>
+          </a:xfrm>
+          <a:prstGeom prst="straightConnector1">
+            <a:avLst/>
+          </a:prstGeom>
+          <a:ln>
+            <a:tailEnd type="arrow"/>
+          </a:ln>
+        </p:spPr>
+        <p:style>
+          <a:lnRef idx="1">
+            <a:schemeClr val="accent1"/>
+          </a:lnRef>
+          <a:fillRef idx="0">
+            <a:schemeClr val="accent1"/>
+          </a:fillRef>
+          <a:effectRef idx="0">
+            <a:schemeClr val="accent1"/>
+          </a:effectRef>
+          <a:fontRef idx="minor">
+            <a:schemeClr val="tx1"/>
+          </a:fontRef>
+        </p:style>
+      </p:cxnSp>
+      <p:sp>
+        <p:nvSpPr>
+          <p:cNvPr id="32" name="Oval 31"/>
+          <p:cNvSpPr/>
+          <p:nvPr/>
+        </p:nvSpPr>
+        <p:spPr>
+          <a:xfrm>
+            <a:off x="4644008" y="3859407"/>
+            <a:ext cx="648072" cy="648072"/>
+          </a:xfrm>
+          <a:prstGeom prst="ellipse">
+            <a:avLst/>
+          </a:prstGeom>
+          <a:solidFill>
+            <a:schemeClr val="bg2"/>
+          </a:solidFill>
+        </p:spPr>
+        <p:style>
+          <a:lnRef idx="2">
+            <a:schemeClr val="accent1">
+              <a:shade val="50000"/>
+            </a:schemeClr>
+          </a:lnRef>
+          <a:fillRef idx="1">
+            <a:schemeClr val="accent1"/>
+          </a:fillRef>
+          <a:effectRef idx="0">
+            <a:schemeClr val="accent1"/>
+          </a:effectRef>
+          <a:fontRef idx="minor">
+            <a:schemeClr val="lt1"/>
+          </a:fontRef>
+        </p:style>
+        <p:txBody>
+          <a:bodyPr rtlCol="0" anchor="ctr"/>
+          <a:lstStyle/>
+          <a:p>
+            <a:pPr algn="ctr"/>
+            <a:endParaRPr lang="en-AU"/>
+          </a:p>
+        </p:txBody>
+      </p:sp>
+      <p:sp>
+        <p:nvSpPr>
+          <p:cNvPr id="33" name="Oval 32"/>
+          <p:cNvSpPr/>
+          <p:nvPr/>
+        </p:nvSpPr>
+        <p:spPr>
+          <a:xfrm>
+            <a:off x="4644008" y="4795511"/>
+            <a:ext cx="648072" cy="648072"/>
+          </a:xfrm>
+          <a:prstGeom prst="ellipse">
+            <a:avLst/>
+          </a:prstGeom>
+          <a:solidFill>
+            <a:schemeClr val="bg2"/>
+          </a:solidFill>
+        </p:spPr>
+        <p:style>
+          <a:lnRef idx="2">
+            <a:schemeClr val="accent1">
+              <a:shade val="50000"/>
+            </a:schemeClr>
+          </a:lnRef>
+          <a:fillRef idx="1">
+            <a:schemeClr val="accent1"/>
+          </a:fillRef>
+          <a:effectRef idx="0">
+            <a:schemeClr val="accent1"/>
+          </a:effectRef>
+          <a:fontRef idx="minor">
+            <a:schemeClr val="lt1"/>
+          </a:fontRef>
+        </p:style>
+        <p:txBody>
+          <a:bodyPr rtlCol="0" anchor="ctr"/>
+          <a:lstStyle/>
+          <a:p>
+            <a:pPr algn="ctr"/>
+            <a:endParaRPr lang="en-AU"/>
+          </a:p>
+        </p:txBody>
+      </p:sp>
+      <p:sp>
+        <p:nvSpPr>
+          <p:cNvPr id="34" name="Oval 33"/>
+          <p:cNvSpPr/>
+          <p:nvPr/>
+        </p:nvSpPr>
+        <p:spPr>
+          <a:xfrm>
+            <a:off x="4644008" y="5693970"/>
+            <a:ext cx="648072" cy="648072"/>
+          </a:xfrm>
+          <a:prstGeom prst="ellipse">
+            <a:avLst/>
+          </a:prstGeom>
+          <a:solidFill>
+            <a:schemeClr val="bg2"/>
+          </a:solidFill>
+        </p:spPr>
+        <p:style>
+          <a:lnRef idx="2">
+            <a:schemeClr val="accent1">
+              <a:shade val="50000"/>
+            </a:schemeClr>
+          </a:lnRef>
+          <a:fillRef idx="1">
+            <a:schemeClr val="accent1"/>
+          </a:fillRef>
+          <a:effectRef idx="0">
+            <a:schemeClr val="accent1"/>
+          </a:effectRef>
+          <a:fontRef idx="minor">
+            <a:schemeClr val="lt1"/>
+          </a:fontRef>
+        </p:style>
+        <p:txBody>
+          <a:bodyPr rtlCol="0" anchor="ctr"/>
+          <a:lstStyle/>
+          <a:p>
+            <a:pPr algn="ctr"/>
+            <a:endParaRPr lang="en-AU"/>
+          </a:p>
+        </p:txBody>
+      </p:sp>
+      <p:sp>
+        <p:nvSpPr>
+          <p:cNvPr id="35" name="Oval 34"/>
+          <p:cNvSpPr/>
+          <p:nvPr/>
+        </p:nvSpPr>
+        <p:spPr>
+          <a:xfrm>
+            <a:off x="5796136" y="4795511"/>
+            <a:ext cx="648072" cy="648072"/>
+          </a:xfrm>
+          <a:prstGeom prst="ellipse">
+            <a:avLst/>
+          </a:prstGeom>
+          <a:solidFill>
+            <a:schemeClr val="bg2"/>
+          </a:solidFill>
+        </p:spPr>
+        <p:style>
+          <a:lnRef idx="2">
+            <a:schemeClr val="accent1">
+              <a:shade val="50000"/>
+            </a:schemeClr>
+          </a:lnRef>
+          <a:fillRef idx="1">
+            <a:schemeClr val="accent1"/>
+          </a:fillRef>
+          <a:effectRef idx="0">
+            <a:schemeClr val="accent1"/>
+          </a:effectRef>
+          <a:fontRef idx="minor">
+            <a:schemeClr val="lt1"/>
+          </a:fontRef>
+        </p:style>
+        <p:txBody>
+          <a:bodyPr rtlCol="0" anchor="ctr"/>
+          <a:lstStyle/>
+          <a:p>
+            <a:pPr algn="ctr"/>
+            <a:endParaRPr lang="en-AU"/>
+          </a:p>
+        </p:txBody>
+      </p:sp>
+      <p:sp>
+        <p:nvSpPr>
+          <p:cNvPr id="36" name="Oval 35"/>
+          <p:cNvSpPr/>
+          <p:nvPr/>
+        </p:nvSpPr>
+        <p:spPr>
+          <a:xfrm>
+            <a:off x="5796136" y="5693970"/>
+            <a:ext cx="648072" cy="648072"/>
+          </a:xfrm>
+          <a:prstGeom prst="ellipse">
+            <a:avLst/>
+          </a:prstGeom>
+          <a:solidFill>
+            <a:schemeClr val="bg2"/>
+          </a:solidFill>
+        </p:spPr>
+        <p:style>
+          <a:lnRef idx="2">
+            <a:schemeClr val="accent1">
+              <a:shade val="50000"/>
+            </a:schemeClr>
+          </a:lnRef>
+          <a:fillRef idx="1">
+            <a:schemeClr val="accent1"/>
+          </a:fillRef>
+          <a:effectRef idx="0">
+            <a:schemeClr val="accent1"/>
+          </a:effectRef>
+          <a:fontRef idx="minor">
+            <a:schemeClr val="lt1"/>
+          </a:fontRef>
+        </p:style>
+        <p:txBody>
+          <a:bodyPr rtlCol="0" anchor="ctr"/>
+          <a:lstStyle/>
+          <a:p>
+            <a:pPr algn="ctr"/>
+            <a:endParaRPr lang="en-AU"/>
+          </a:p>
+        </p:txBody>
+      </p:sp>
+      <p:cxnSp>
+        <p:nvCxnSpPr>
+          <p:cNvPr id="37" name="Straight Arrow Connector 36"/>
+          <p:cNvCxnSpPr/>
+          <p:nvPr/>
+        </p:nvCxnSpPr>
+        <p:spPr>
+          <a:xfrm>
+            <a:off x="4968044" y="4507479"/>
+            <a:ext cx="0" cy="288032"/>
+          </a:xfrm>
+          <a:prstGeom prst="straightConnector1">
+            <a:avLst/>
+          </a:prstGeom>
+          <a:ln>
+            <a:tailEnd type="arrow"/>
+          </a:ln>
+        </p:spPr>
+        <p:style>
+          <a:lnRef idx="1">
+            <a:schemeClr val="accent1"/>
+          </a:lnRef>
+          <a:fillRef idx="0">
+            <a:schemeClr val="accent1"/>
+          </a:fillRef>
+          <a:effectRef idx="0">
+            <a:schemeClr val="accent1"/>
+          </a:effectRef>
+          <a:fontRef idx="minor">
+            <a:schemeClr val="tx1"/>
+          </a:fontRef>
+        </p:style>
+      </p:cxnSp>
+      <p:cxnSp>
+        <p:nvCxnSpPr>
+          <p:cNvPr id="38" name="Straight Arrow Connector 37"/>
+          <p:cNvCxnSpPr/>
+          <p:nvPr/>
+        </p:nvCxnSpPr>
+        <p:spPr>
+          <a:xfrm>
+            <a:off x="4968044" y="5443583"/>
+            <a:ext cx="0" cy="288032"/>
+          </a:xfrm>
+          <a:prstGeom prst="straightConnector1">
+            <a:avLst/>
+          </a:prstGeom>
+          <a:ln>
+            <a:tailEnd type="arrow"/>
+          </a:ln>
+        </p:spPr>
+        <p:style>
+          <a:lnRef idx="1">
+            <a:schemeClr val="accent1"/>
+          </a:lnRef>
+          <a:fillRef idx="0">
+            <a:schemeClr val="accent1"/>
+          </a:fillRef>
+          <a:effectRef idx="0">
+            <a:schemeClr val="accent1"/>
+          </a:effectRef>
+          <a:fontRef idx="minor">
+            <a:schemeClr val="tx1"/>
+          </a:fontRef>
+        </p:style>
+      </p:cxnSp>
+      <p:cxnSp>
+        <p:nvCxnSpPr>
+          <p:cNvPr id="39" name="Straight Arrow Connector 38"/>
+          <p:cNvCxnSpPr>
+            <a:stCxn id="34" idx="6"/>
+            <a:endCxn id="36" idx="2"/>
+          </p:cNvCxnSpPr>
+          <p:nvPr/>
+        </p:nvCxnSpPr>
+        <p:spPr>
+          <a:xfrm>
+            <a:off x="5292080" y="6018006"/>
+            <a:ext cx="504056" cy="0"/>
+          </a:xfrm>
+          <a:prstGeom prst="straightConnector1">
+            <a:avLst/>
+          </a:prstGeom>
+          <a:ln>
+            <a:tailEnd type="arrow"/>
+          </a:ln>
+        </p:spPr>
+        <p:style>
+          <a:lnRef idx="1">
+            <a:schemeClr val="accent1"/>
+          </a:lnRef>
+          <a:fillRef idx="0">
+            <a:schemeClr val="accent1"/>
+          </a:fillRef>
+          <a:effectRef idx="0">
+            <a:schemeClr val="accent1"/>
+          </a:effectRef>
+          <a:fontRef idx="minor">
+            <a:schemeClr val="tx1"/>
+          </a:fontRef>
+        </p:style>
+      </p:cxnSp>
+      <p:cxnSp>
+        <p:nvCxnSpPr>
+          <p:cNvPr id="40" name="Straight Arrow Connector 39"/>
+          <p:cNvCxnSpPr>
+            <a:stCxn id="36" idx="0"/>
+          </p:cNvCxnSpPr>
+          <p:nvPr/>
+        </p:nvCxnSpPr>
+        <p:spPr>
+          <a:xfrm flipV="1">
+            <a:off x="6120172" y="5443583"/>
+            <a:ext cx="0" cy="250387"/>
+          </a:xfrm>
+          <a:prstGeom prst="straightConnector1">
+            <a:avLst/>
+          </a:prstGeom>
+          <a:ln>
+            <a:tailEnd type="arrow"/>
+          </a:ln>
+        </p:spPr>
+        <p:style>
+          <a:lnRef idx="1">
+            <a:schemeClr val="accent1"/>
+          </a:lnRef>
+          <a:fillRef idx="0">
+            <a:schemeClr val="accent1"/>
+          </a:fillRef>
+          <a:effectRef idx="0">
+            <a:schemeClr val="accent1"/>
+          </a:effectRef>
+          <a:fontRef idx="minor">
+            <a:schemeClr val="tx1"/>
+          </a:fontRef>
+        </p:style>
+      </p:cxnSp>
+      <p:cxnSp>
+        <p:nvCxnSpPr>
+          <p:cNvPr id="41" name="Straight Arrow Connector 40"/>
+          <p:cNvCxnSpPr>
+            <a:endCxn id="33" idx="6"/>
+          </p:cNvCxnSpPr>
+          <p:nvPr/>
+        </p:nvCxnSpPr>
+        <p:spPr>
+          <a:xfrm flipH="1">
+            <a:off x="5292080" y="5119547"/>
+            <a:ext cx="504056" cy="0"/>
+          </a:xfrm>
+          <a:prstGeom prst="straightConnector1">
+            <a:avLst/>
+          </a:prstGeom>
+          <a:ln>
+            <a:tailEnd type="arrow"/>
+          </a:ln>
+        </p:spPr>
+        <p:style>
+          <a:lnRef idx="1">
+            <a:schemeClr val="accent1"/>
+          </a:lnRef>
+          <a:fillRef idx="0">
+            <a:schemeClr val="accent1"/>
+          </a:fillRef>
+          <a:effectRef idx="0">
+            <a:schemeClr val="accent1"/>
+          </a:effectRef>
+          <a:fontRef idx="minor">
+            <a:schemeClr val="tx1"/>
+          </a:fontRef>
+        </p:style>
+      </p:cxnSp>
+      <p:sp>
+        <p:nvSpPr>
+          <p:cNvPr id="42" name="Oval 41"/>
+          <p:cNvSpPr/>
+          <p:nvPr/>
+        </p:nvSpPr>
+        <p:spPr>
+          <a:xfrm>
+            <a:off x="6660232" y="3859407"/>
+            <a:ext cx="648072" cy="648072"/>
+          </a:xfrm>
+          <a:prstGeom prst="ellipse">
+            <a:avLst/>
+          </a:prstGeom>
+          <a:solidFill>
+            <a:schemeClr val="bg2"/>
+          </a:solidFill>
+        </p:spPr>
+        <p:style>
+          <a:lnRef idx="2">
+            <a:schemeClr val="accent1">
+              <a:shade val="50000"/>
+            </a:schemeClr>
+          </a:lnRef>
+          <a:fillRef idx="1">
+            <a:schemeClr val="accent1"/>
+          </a:fillRef>
+          <a:effectRef idx="0">
+            <a:schemeClr val="accent1"/>
+          </a:effectRef>
+          <a:fontRef idx="minor">
+            <a:schemeClr val="lt1"/>
+          </a:fontRef>
+        </p:style>
+        <p:txBody>
+          <a:bodyPr rtlCol="0" anchor="ctr"/>
+          <a:lstStyle/>
+          <a:p>
+            <a:pPr algn="ctr"/>
+            <a:endParaRPr lang="en-AU"/>
+          </a:p>
+        </p:txBody>
+      </p:sp>
+      <p:sp>
+        <p:nvSpPr>
+          <p:cNvPr id="43" name="Oval 42"/>
+          <p:cNvSpPr/>
+          <p:nvPr/>
+        </p:nvSpPr>
+        <p:spPr>
+          <a:xfrm>
+            <a:off x="6660232" y="4795511"/>
+            <a:ext cx="648072" cy="648072"/>
+          </a:xfrm>
+          <a:prstGeom prst="ellipse">
+            <a:avLst/>
+          </a:prstGeom>
+          <a:solidFill>
+            <a:schemeClr val="bg2"/>
+          </a:solidFill>
+        </p:spPr>
+        <p:style>
+          <a:lnRef idx="2">
+            <a:schemeClr val="accent1">
+              <a:shade val="50000"/>
+            </a:schemeClr>
+          </a:lnRef>
+          <a:fillRef idx="1">
+            <a:schemeClr val="accent1"/>
+          </a:fillRef>
+          <a:effectRef idx="0">
+            <a:schemeClr val="accent1"/>
+          </a:effectRef>
+          <a:fontRef idx="minor">
+            <a:schemeClr val="lt1"/>
+          </a:fontRef>
+        </p:style>
+        <p:txBody>
+          <a:bodyPr rtlCol="0" anchor="ctr"/>
+          <a:lstStyle/>
+          <a:p>
+            <a:pPr algn="ctr"/>
+            <a:endParaRPr lang="en-AU"/>
+          </a:p>
+        </p:txBody>
+      </p:sp>
+      <p:sp>
+        <p:nvSpPr>
+          <p:cNvPr id="44" name="Oval 43"/>
+          <p:cNvSpPr/>
+          <p:nvPr/>
+        </p:nvSpPr>
+        <p:spPr>
+          <a:xfrm>
+            <a:off x="6660232" y="5693970"/>
+            <a:ext cx="648072" cy="648072"/>
+          </a:xfrm>
+          <a:prstGeom prst="ellipse">
+            <a:avLst/>
+          </a:prstGeom>
+          <a:solidFill>
+            <a:schemeClr val="bg2"/>
+          </a:solidFill>
+        </p:spPr>
+        <p:style>
+          <a:lnRef idx="2">
+            <a:schemeClr val="accent1">
+              <a:shade val="50000"/>
+            </a:schemeClr>
+          </a:lnRef>
+          <a:fillRef idx="1">
+            <a:schemeClr val="accent1"/>
+          </a:fillRef>
+          <a:effectRef idx="0">
+            <a:schemeClr val="accent1"/>
+          </a:effectRef>
+          <a:fontRef idx="minor">
+            <a:schemeClr val="lt1"/>
+          </a:fontRef>
+        </p:style>
+        <p:txBody>
+          <a:bodyPr rtlCol="0" anchor="ctr"/>
+          <a:lstStyle/>
+          <a:p>
+            <a:pPr algn="ctr"/>
+            <a:endParaRPr lang="en-AU"/>
+          </a:p>
+        </p:txBody>
+      </p:sp>
+      <p:sp>
+        <p:nvSpPr>
+          <p:cNvPr id="45" name="Oval 44"/>
+          <p:cNvSpPr/>
+          <p:nvPr/>
+        </p:nvSpPr>
+        <p:spPr>
+          <a:xfrm>
+            <a:off x="7812360" y="4795511"/>
+            <a:ext cx="648072" cy="648072"/>
+          </a:xfrm>
+          <a:prstGeom prst="ellipse">
+            <a:avLst/>
+          </a:prstGeom>
+          <a:solidFill>
+            <a:schemeClr val="tx1"/>
+          </a:solidFill>
+        </p:spPr>
+        <p:style>
+          <a:lnRef idx="2">
+            <a:schemeClr val="accent1">
+              <a:shade val="50000"/>
+            </a:schemeClr>
+          </a:lnRef>
+          <a:fillRef idx="1">
+            <a:schemeClr val="accent1"/>
+          </a:fillRef>
+          <a:effectRef idx="0">
+            <a:schemeClr val="accent1"/>
+          </a:effectRef>
+          <a:fontRef idx="minor">
+            <a:schemeClr val="lt1"/>
+          </a:fontRef>
+        </p:style>
+        <p:txBody>
+          <a:bodyPr rtlCol="0" anchor="ctr"/>
+          <a:lstStyle/>
+          <a:p>
+            <a:pPr algn="ctr"/>
+            <a:endParaRPr lang="en-AU"/>
+          </a:p>
+        </p:txBody>
+      </p:sp>
+      <p:sp>
+        <p:nvSpPr>
+          <p:cNvPr id="46" name="Oval 45"/>
+          <p:cNvSpPr/>
+          <p:nvPr/>
+        </p:nvSpPr>
+        <p:spPr>
+          <a:xfrm>
+            <a:off x="7812360" y="5693970"/>
+            <a:ext cx="648072" cy="648072"/>
+          </a:xfrm>
+          <a:prstGeom prst="ellipse">
+            <a:avLst/>
+          </a:prstGeom>
+          <a:solidFill>
+            <a:schemeClr val="tx1"/>
+          </a:solidFill>
+        </p:spPr>
+        <p:style>
+          <a:lnRef idx="2">
+            <a:schemeClr val="accent1">
+              <a:shade val="50000"/>
+            </a:schemeClr>
+          </a:lnRef>
+          <a:fillRef idx="1">
+            <a:schemeClr val="accent1"/>
+          </a:fillRef>
+          <a:effectRef idx="0">
+            <a:schemeClr val="accent1"/>
+          </a:effectRef>
+          <a:fontRef idx="minor">
+            <a:schemeClr val="lt1"/>
+          </a:fontRef>
+        </p:style>
+        <p:txBody>
+          <a:bodyPr rtlCol="0" anchor="ctr"/>
+          <a:lstStyle/>
+          <a:p>
+            <a:pPr algn="ctr"/>
+            <a:endParaRPr lang="en-AU"/>
+          </a:p>
+        </p:txBody>
+      </p:sp>
+      <p:cxnSp>
+        <p:nvCxnSpPr>
+          <p:cNvPr id="47" name="Straight Arrow Connector 46"/>
+          <p:cNvCxnSpPr/>
+          <p:nvPr/>
+        </p:nvCxnSpPr>
+        <p:spPr>
+          <a:xfrm>
+            <a:off x="6984268" y="4507479"/>
+            <a:ext cx="0" cy="288032"/>
+          </a:xfrm>
+          <a:prstGeom prst="straightConnector1">
+            <a:avLst/>
+          </a:prstGeom>
+          <a:ln>
+            <a:tailEnd type="arrow"/>
+          </a:ln>
+        </p:spPr>
+        <p:style>
+          <a:lnRef idx="1">
+            <a:schemeClr val="accent1"/>
+          </a:lnRef>
+          <a:fillRef idx="0">
+            <a:schemeClr val="accent1"/>
+          </a:fillRef>
+          <a:effectRef idx="0">
+            <a:schemeClr val="accent1"/>
+          </a:effectRef>
+          <a:fontRef idx="minor">
+            <a:schemeClr val="tx1"/>
+          </a:fontRef>
+        </p:style>
+      </p:cxnSp>
+      <p:cxnSp>
+        <p:nvCxnSpPr>
+          <p:cNvPr id="48" name="Straight Arrow Connector 47"/>
+          <p:cNvCxnSpPr/>
+          <p:nvPr/>
+        </p:nvCxnSpPr>
+        <p:spPr>
+          <a:xfrm>
+            <a:off x="6984268" y="5443583"/>
+            <a:ext cx="0" cy="288032"/>
+          </a:xfrm>
+          <a:prstGeom prst="straightConnector1">
+            <a:avLst/>
+          </a:prstGeom>
+          <a:ln>
+            <a:tailEnd type="arrow"/>
+          </a:ln>
+        </p:spPr>
+        <p:style>
+          <a:lnRef idx="1">
+            <a:schemeClr val="accent1"/>
+          </a:lnRef>
+          <a:fillRef idx="0">
+            <a:schemeClr val="accent1"/>
+          </a:fillRef>
+          <a:effectRef idx="0">
+            <a:schemeClr val="accent1"/>
+          </a:effectRef>
+          <a:fontRef idx="minor">
+            <a:schemeClr val="tx1"/>
+          </a:fontRef>
+        </p:style>
+      </p:cxnSp>
+      <p:cxnSp>
+        <p:nvCxnSpPr>
+          <p:cNvPr id="49" name="Straight Arrow Connector 48"/>
+          <p:cNvCxnSpPr>
+            <a:stCxn id="44" idx="6"/>
+            <a:endCxn id="46" idx="2"/>
+          </p:cNvCxnSpPr>
+          <p:nvPr/>
+        </p:nvCxnSpPr>
+        <p:spPr>
+          <a:xfrm>
+            <a:off x="7308304" y="6018006"/>
+            <a:ext cx="504056" cy="0"/>
+          </a:xfrm>
+          <a:prstGeom prst="straightConnector1">
+            <a:avLst/>
+          </a:prstGeom>
+          <a:ln>
+            <a:tailEnd type="arrow"/>
+          </a:ln>
+        </p:spPr>
+        <p:style>
+          <a:lnRef idx="1">
+            <a:schemeClr val="accent1"/>
+          </a:lnRef>
+          <a:fillRef idx="0">
+            <a:schemeClr val="accent1"/>
+          </a:fillRef>
+          <a:effectRef idx="0">
+            <a:schemeClr val="accent1"/>
+          </a:effectRef>
+          <a:fontRef idx="minor">
+            <a:schemeClr val="tx1"/>
+          </a:fontRef>
+        </p:style>
+      </p:cxnSp>
+      <p:cxnSp>
+        <p:nvCxnSpPr>
+          <p:cNvPr id="50" name="Straight Arrow Connector 49"/>
+          <p:cNvCxnSpPr>
+            <a:stCxn id="46" idx="0"/>
+          </p:cNvCxnSpPr>
+          <p:nvPr/>
+        </p:nvCxnSpPr>
+        <p:spPr>
+          <a:xfrm flipV="1">
+            <a:off x="8136396" y="5443583"/>
+            <a:ext cx="0" cy="250387"/>
+          </a:xfrm>
+          <a:prstGeom prst="straightConnector1">
+            <a:avLst/>
+          </a:prstGeom>
+          <a:ln>
+            <a:tailEnd type="arrow"/>
+          </a:ln>
+        </p:spPr>
+        <p:style>
+          <a:lnRef idx="1">
+            <a:schemeClr val="accent1"/>
+          </a:lnRef>
+          <a:fillRef idx="0">
+            <a:schemeClr val="accent1"/>
+          </a:fillRef>
+          <a:effectRef idx="0">
+            <a:schemeClr val="accent1"/>
+          </a:effectRef>
+          <a:fontRef idx="minor">
+            <a:schemeClr val="tx1"/>
+          </a:fontRef>
+        </p:style>
+      </p:cxnSp>
+      <p:cxnSp>
+        <p:nvCxnSpPr>
+          <p:cNvPr id="51" name="Straight Arrow Connector 50"/>
+          <p:cNvCxnSpPr>
+            <a:endCxn id="43" idx="6"/>
+          </p:cNvCxnSpPr>
+          <p:nvPr/>
+        </p:nvCxnSpPr>
+        <p:spPr>
+          <a:xfrm flipH="1">
+            <a:off x="7308304" y="5119547"/>
+            <a:ext cx="504056" cy="0"/>
+          </a:xfrm>
+          <a:prstGeom prst="straightConnector1">
+            <a:avLst/>
+          </a:prstGeom>
+          <a:ln>
+            <a:tailEnd type="arrow"/>
+          </a:ln>
+        </p:spPr>
+        <p:style>
+          <a:lnRef idx="1">
+            <a:schemeClr val="accent1"/>
+          </a:lnRef>
+          <a:fillRef idx="0">
+            <a:schemeClr val="accent1"/>
+          </a:fillRef>
+          <a:effectRef idx="0">
+            <a:schemeClr val="accent1"/>
+          </a:effectRef>
+          <a:fontRef idx="minor">
+            <a:schemeClr val="tx1"/>
+          </a:fontRef>
+        </p:style>
+      </p:cxnSp>
+      <p:cxnSp>
+        <p:nvCxnSpPr>
+          <p:cNvPr id="53" name="Straight Arrow Connector 52"/>
+          <p:cNvCxnSpPr>
+            <a:endCxn id="33" idx="6"/>
+          </p:cNvCxnSpPr>
+          <p:nvPr/>
+        </p:nvCxnSpPr>
+        <p:spPr>
+          <a:xfrm flipH="1">
+            <a:off x="5292080" y="4183443"/>
+            <a:ext cx="432048" cy="936104"/>
+          </a:xfrm>
+          <a:prstGeom prst="straightConnector1">
+            <a:avLst/>
+          </a:prstGeom>
+          <a:ln>
+            <a:tailEnd type="arrow"/>
+          </a:ln>
+        </p:spPr>
+        <p:style>
+          <a:lnRef idx="1">
+            <a:schemeClr val="accent1"/>
+          </a:lnRef>
+          <a:fillRef idx="0">
+            <a:schemeClr val="accent1"/>
+          </a:fillRef>
+          <a:effectRef idx="0">
+            <a:schemeClr val="accent1"/>
+          </a:effectRef>
+          <a:fontRef idx="minor">
+            <a:schemeClr val="tx1"/>
+          </a:fontRef>
+        </p:style>
+      </p:cxnSp>
+      <p:sp>
+        <p:nvSpPr>
+          <p:cNvPr id="54" name="TextBox 53"/>
+          <p:cNvSpPr txBox="1"/>
+          <p:nvPr/>
+        </p:nvSpPr>
+        <p:spPr>
+          <a:xfrm>
+            <a:off x="5508104" y="3931415"/>
+            <a:ext cx="720080" cy="369332"/>
+          </a:xfrm>
+          <a:prstGeom prst="rect">
+            <a:avLst/>
+          </a:prstGeom>
+          <a:noFill/>
+        </p:spPr>
+        <p:txBody>
+          <a:bodyPr wrap="square" rtlCol="0">
+            <a:spAutoFit/>
+          </a:bodyPr>
+          <a:lstStyle/>
+          <a:p>
+            <a:r>
+              <a:rPr lang="en-AU" dirty="0" smtClean="0"/>
+              <a:t>Cycle</a:t>
+            </a:r>
+            <a:endParaRPr lang="en-AU" dirty="0"/>
+          </a:p>
+        </p:txBody>
+      </p:sp>
+    </p:spTree>
+    <p:extLst>
+      <p:ext uri="{BB962C8B-B14F-4D97-AF65-F5344CB8AC3E}">
+        <p14:creationId xmlns:p14="http://schemas.microsoft.com/office/powerpoint/2010/main" val="2634918392"/>
+      </p:ext>
+    </p:extLst>
+  </p:cSld>
+  <p:clrMapOvr>
+    <a:masterClrMapping/>
+  </p:clrMapOvr>
+</p:sld>
+</file>
+
+<file path=ppt/slides/slide13.xml><?xml version="1.0" encoding="utf-8"?>
 <p:sld xmlns:a="http://schemas.openxmlformats.org/drawingml/2006/main" xmlns:r="http://schemas.openxmlformats.org/officeDocument/2006/relationships" xmlns:p="http://schemas.openxmlformats.org/presentationml/2006/main">
   <p:cSld>
     <p:spTree>
@@ -4260,13 +6141,8 @@
             </a:pPr>
             <a:r>
               <a:rPr lang="en-AU" dirty="0" smtClean="0"/>
-              <a:t>Continue </a:t>
-            </a:r>
-            <a:r>
-              <a:rPr lang="en-AU" dirty="0" smtClean="0"/>
-              <a:t>until each node has been visited once</a:t>
-            </a:r>
-            <a:endParaRPr lang="en-AU" dirty="0" smtClean="0"/>
+              <a:t>Continue until each node has been visited once</a:t>
+            </a:r>
           </a:p>
           <a:p>
             <a:pPr marL="514350" indent="-514350">

</xml_diff>